<commit_message>
up to lab 4
</commit_message>
<xml_diff>
--- a/pres-source/06-additional-tools.pptx
+++ b/pres-source/06-additional-tools.pptx
@@ -5,7 +5,7 @@
     <p:sldMasterId id="2147483648" r:id="rId1"/>
   </p:sldMasterIdLst>
   <p:notesMasterIdLst>
-    <p:notesMasterId r:id="rId32"/>
+    <p:notesMasterId r:id="rId34"/>
   </p:notesMasterIdLst>
   <p:sldIdLst>
     <p:sldId id="256" r:id="rId2"/>
@@ -35,9 +35,11 @@
     <p:sldId id="322" r:id="rId26"/>
     <p:sldId id="323" r:id="rId27"/>
     <p:sldId id="319" r:id="rId28"/>
-    <p:sldId id="320" r:id="rId29"/>
-    <p:sldId id="321" r:id="rId30"/>
-    <p:sldId id="278" r:id="rId31"/>
+    <p:sldId id="324" r:id="rId29"/>
+    <p:sldId id="325" r:id="rId30"/>
+    <p:sldId id="320" r:id="rId31"/>
+    <p:sldId id="321" r:id="rId32"/>
+    <p:sldId id="278" r:id="rId33"/>
   </p:sldIdLst>
   <p:sldSz cx="9144000" cy="6858000" type="screen4x3"/>
   <p:notesSz cx="6858000" cy="9144000"/>
@@ -136,6 +138,36 @@
       </a:defRPr>
     </a:lvl9pPr>
   </p:defaultTextStyle>
+  <p:extLst>
+    <p:ext uri="{EFAFB233-063F-42B5-8137-9DF3F51BA10A}">
+      <p15:sldGuideLst xmlns:p15="http://schemas.microsoft.com/office/powerpoint/2012/main">
+        <p15:guide id="1" orient="horz" pos="2160">
+          <p15:clr>
+            <a:srgbClr val="A4A3A4"/>
+          </p15:clr>
+        </p15:guide>
+        <p15:guide id="2" pos="2880">
+          <p15:clr>
+            <a:srgbClr val="A4A3A4"/>
+          </p15:clr>
+        </p15:guide>
+      </p15:sldGuideLst>
+    </p:ext>
+    <p:ext uri="{2D200454-40CA-4A62-9FC3-DE9A4176ACB9}">
+      <p15:notesGuideLst xmlns:p15="http://schemas.microsoft.com/office/powerpoint/2012/main">
+        <p15:guide id="1" orient="horz" pos="2880">
+          <p15:clr>
+            <a:srgbClr val="A4A3A4"/>
+          </p15:clr>
+        </p15:guide>
+        <p15:guide id="2" pos="2160">
+          <p15:clr>
+            <a:srgbClr val="A4A3A4"/>
+          </p15:clr>
+        </p15:guide>
+      </p15:notesGuideLst>
+    </p:ext>
+  </p:extLst>
 </p:presentation>
 </file>
 
@@ -226,7 +258,7 @@
             <a:fld id="{7307762F-A706-E543-A832-3C298AA3103F}" type="datetimeFigureOut">
               <a:rPr lang="en-US" smtClean="0"/>
               <a:pPr/>
-              <a:t>06/12/17</a:t>
+              <a:t>2/18/19</a:t>
             </a:fld>
             <a:endParaRPr lang="en-US" dirty="0"/>
           </a:p>
@@ -290,38 +322,37 @@
           <a:p>
             <a:pPr lvl="0"/>
             <a:r>
-              <a:rPr lang="en-US" dirty="0" smtClean="0"/>
+              <a:rPr lang="en-US" dirty="0"/>
               <a:t>Click to edit Master text styles</a:t>
             </a:r>
           </a:p>
           <a:p>
             <a:pPr lvl="1"/>
             <a:r>
-              <a:rPr lang="en-US" dirty="0" smtClean="0"/>
+              <a:rPr lang="en-US" dirty="0"/>
               <a:t>Second level</a:t>
             </a:r>
           </a:p>
           <a:p>
             <a:pPr lvl="2"/>
             <a:r>
-              <a:rPr lang="en-US" dirty="0" smtClean="0"/>
+              <a:rPr lang="en-US" dirty="0"/>
               <a:t>Third level</a:t>
             </a:r>
           </a:p>
           <a:p>
             <a:pPr lvl="3"/>
             <a:r>
-              <a:rPr lang="en-US" dirty="0" smtClean="0"/>
+              <a:rPr lang="en-US" dirty="0"/>
               <a:t>Fourth level</a:t>
             </a:r>
           </a:p>
           <a:p>
             <a:pPr lvl="4"/>
             <a:r>
-              <a:rPr lang="en-US" dirty="0" smtClean="0"/>
+              <a:rPr lang="en-US" dirty="0"/>
               <a:t>Fifth level</a:t>
             </a:r>
-            <a:endParaRPr lang="en-US" dirty="0"/>
           </a:p>
         </p:txBody>
       </p:sp>
@@ -537,10 +568,9 @@
           <a:lstStyle/>
           <a:p>
             <a:r>
-              <a:rPr lang="en-US" smtClean="0"/>
+              <a:rPr lang="en-US"/>
               <a:t>Click to edit Master title style</a:t>
             </a:r>
-            <a:endParaRPr lang="en-US"/>
           </a:p>
         </p:txBody>
       </p:sp>
@@ -656,10 +686,9 @@
           </a:lstStyle>
           <a:p>
             <a:r>
-              <a:rPr lang="en-US" smtClean="0"/>
+              <a:rPr lang="en-US"/>
               <a:t>Click to edit Master subtitle style</a:t>
             </a:r>
-            <a:endParaRPr lang="en-US"/>
           </a:p>
         </p:txBody>
       </p:sp>
@@ -709,10 +738,9 @@
           <a:lstStyle/>
           <a:p>
             <a:r>
-              <a:rPr lang="en-US" smtClean="0"/>
+              <a:rPr lang="en-US"/>
               <a:t>Click to edit Master title style</a:t>
             </a:r>
-            <a:endParaRPr lang="en-US"/>
           </a:p>
         </p:txBody>
       </p:sp>
@@ -733,38 +761,37 @@
           <a:p>
             <a:pPr lvl="0"/>
             <a:r>
-              <a:rPr lang="en-US" smtClean="0"/>
+              <a:rPr lang="en-US"/>
               <a:t>Click to edit Master text styles</a:t>
             </a:r>
           </a:p>
           <a:p>
             <a:pPr lvl="1"/>
             <a:r>
-              <a:rPr lang="en-US" smtClean="0"/>
+              <a:rPr lang="en-US"/>
               <a:t>Second level</a:t>
             </a:r>
           </a:p>
           <a:p>
             <a:pPr lvl="2"/>
             <a:r>
-              <a:rPr lang="en-US" smtClean="0"/>
+              <a:rPr lang="en-US"/>
               <a:t>Third level</a:t>
             </a:r>
           </a:p>
           <a:p>
             <a:pPr lvl="3"/>
             <a:r>
-              <a:rPr lang="en-US" smtClean="0"/>
+              <a:rPr lang="en-US"/>
               <a:t>Fourth level</a:t>
             </a:r>
           </a:p>
           <a:p>
             <a:pPr lvl="4"/>
             <a:r>
-              <a:rPr lang="en-US" smtClean="0"/>
+              <a:rPr lang="en-US"/>
               <a:t>Fifth level</a:t>
             </a:r>
-            <a:endParaRPr lang="en-US"/>
           </a:p>
         </p:txBody>
       </p:sp>
@@ -793,7 +820,7 @@
           <a:p>
             <a:fld id="{875CF0EB-321F-0749-B37A-89BBA859503C}" type="datetimeFigureOut">
               <a:rPr lang="en-US" smtClean="0"/>
-              <a:t>06/12/17</a:t>
+              <a:t>2/18/19</a:t>
             </a:fld>
             <a:endParaRPr lang="en-US"/>
           </a:p>
@@ -908,10 +935,9 @@
           <a:lstStyle/>
           <a:p>
             <a:r>
-              <a:rPr lang="en-US" smtClean="0"/>
+              <a:rPr lang="en-US"/>
               <a:t>Click to edit Master title style</a:t>
             </a:r>
-            <a:endParaRPr lang="en-US"/>
           </a:p>
         </p:txBody>
       </p:sp>
@@ -937,38 +963,37 @@
           <a:p>
             <a:pPr lvl="0"/>
             <a:r>
-              <a:rPr lang="en-US" smtClean="0"/>
+              <a:rPr lang="en-US"/>
               <a:t>Click to edit Master text styles</a:t>
             </a:r>
           </a:p>
           <a:p>
             <a:pPr lvl="1"/>
             <a:r>
-              <a:rPr lang="en-US" smtClean="0"/>
+              <a:rPr lang="en-US"/>
               <a:t>Second level</a:t>
             </a:r>
           </a:p>
           <a:p>
             <a:pPr lvl="2"/>
             <a:r>
-              <a:rPr lang="en-US" smtClean="0"/>
+              <a:rPr lang="en-US"/>
               <a:t>Third level</a:t>
             </a:r>
           </a:p>
           <a:p>
             <a:pPr lvl="3"/>
             <a:r>
-              <a:rPr lang="en-US" smtClean="0"/>
+              <a:rPr lang="en-US"/>
               <a:t>Fourth level</a:t>
             </a:r>
           </a:p>
           <a:p>
             <a:pPr lvl="4"/>
             <a:r>
-              <a:rPr lang="en-US" smtClean="0"/>
+              <a:rPr lang="en-US"/>
               <a:t>Fifth level</a:t>
             </a:r>
-            <a:endParaRPr lang="en-US"/>
           </a:p>
         </p:txBody>
       </p:sp>
@@ -997,7 +1022,7 @@
           <a:p>
             <a:fld id="{875CF0EB-321F-0749-B37A-89BBA859503C}" type="datetimeFigureOut">
               <a:rPr lang="en-US" smtClean="0"/>
-              <a:t>06/12/17</a:t>
+              <a:t>2/18/19</a:t>
             </a:fld>
             <a:endParaRPr lang="en-US"/>
           </a:p>
@@ -1107,10 +1132,9 @@
           <a:lstStyle/>
           <a:p>
             <a:r>
-              <a:rPr lang="en-US" smtClean="0"/>
+              <a:rPr lang="en-US"/>
               <a:t>Click to edit Master title style</a:t>
             </a:r>
-            <a:endParaRPr lang="en-US"/>
           </a:p>
         </p:txBody>
       </p:sp>
@@ -1131,38 +1155,37 @@
           <a:p>
             <a:pPr lvl="0"/>
             <a:r>
-              <a:rPr lang="en-US" smtClean="0"/>
+              <a:rPr lang="en-US"/>
               <a:t>Click to edit Master text styles</a:t>
             </a:r>
           </a:p>
           <a:p>
             <a:pPr lvl="1"/>
             <a:r>
-              <a:rPr lang="en-US" smtClean="0"/>
+              <a:rPr lang="en-US"/>
               <a:t>Second level</a:t>
             </a:r>
           </a:p>
           <a:p>
             <a:pPr lvl="2"/>
             <a:r>
-              <a:rPr lang="en-US" smtClean="0"/>
+              <a:rPr lang="en-US"/>
               <a:t>Third level</a:t>
             </a:r>
           </a:p>
           <a:p>
             <a:pPr lvl="3"/>
             <a:r>
-              <a:rPr lang="en-US" smtClean="0"/>
+              <a:rPr lang="en-US"/>
               <a:t>Fourth level</a:t>
             </a:r>
           </a:p>
           <a:p>
             <a:pPr lvl="4"/>
             <a:r>
-              <a:rPr lang="en-US" smtClean="0"/>
+              <a:rPr lang="en-US"/>
               <a:t>Fifth level</a:t>
             </a:r>
-            <a:endParaRPr lang="en-US"/>
           </a:p>
         </p:txBody>
       </p:sp>
@@ -1191,7 +1214,7 @@
           <a:p>
             <a:fld id="{875CF0EB-321F-0749-B37A-89BBA859503C}" type="datetimeFigureOut">
               <a:rPr lang="en-US" smtClean="0"/>
-              <a:t>06/12/17</a:t>
+              <a:t>2/18/19</a:t>
             </a:fld>
             <a:endParaRPr lang="en-US"/>
           </a:p>
@@ -1310,10 +1333,9 @@
           </a:lstStyle>
           <a:p>
             <a:r>
-              <a:rPr lang="en-US" smtClean="0"/>
+              <a:rPr lang="en-US"/>
               <a:t>Click to edit Master title style</a:t>
             </a:r>
-            <a:endParaRPr lang="en-US"/>
           </a:p>
         </p:txBody>
       </p:sp>
@@ -1430,7 +1452,7 @@
           <a:p>
             <a:pPr lvl="0"/>
             <a:r>
-              <a:rPr lang="en-US" smtClean="0"/>
+              <a:rPr lang="en-US"/>
               <a:t>Click to edit Master text styles</a:t>
             </a:r>
           </a:p>
@@ -1461,7 +1483,7 @@
           <a:p>
             <a:fld id="{875CF0EB-321F-0749-B37A-89BBA859503C}" type="datetimeFigureOut">
               <a:rPr lang="en-US" smtClean="0"/>
-              <a:t>06/12/17</a:t>
+              <a:t>2/18/19</a:t>
             </a:fld>
             <a:endParaRPr lang="en-US"/>
           </a:p>
@@ -1571,10 +1593,9 @@
           <a:lstStyle/>
           <a:p>
             <a:r>
-              <a:rPr lang="en-US" smtClean="0"/>
+              <a:rPr lang="en-US"/>
               <a:t>Click to edit Master title style</a:t>
             </a:r>
-            <a:endParaRPr lang="en-US"/>
           </a:p>
         </p:txBody>
       </p:sp>
@@ -1628,38 +1649,37 @@
           <a:p>
             <a:pPr lvl="0"/>
             <a:r>
-              <a:rPr lang="en-US" smtClean="0"/>
+              <a:rPr lang="en-US"/>
               <a:t>Click to edit Master text styles</a:t>
             </a:r>
           </a:p>
           <a:p>
             <a:pPr lvl="1"/>
             <a:r>
-              <a:rPr lang="en-US" smtClean="0"/>
+              <a:rPr lang="en-US"/>
               <a:t>Second level</a:t>
             </a:r>
           </a:p>
           <a:p>
             <a:pPr lvl="2"/>
             <a:r>
-              <a:rPr lang="en-US" smtClean="0"/>
+              <a:rPr lang="en-US"/>
               <a:t>Third level</a:t>
             </a:r>
           </a:p>
           <a:p>
             <a:pPr lvl="3"/>
             <a:r>
-              <a:rPr lang="en-US" smtClean="0"/>
+              <a:rPr lang="en-US"/>
               <a:t>Fourth level</a:t>
             </a:r>
           </a:p>
           <a:p>
             <a:pPr lvl="4"/>
             <a:r>
-              <a:rPr lang="en-US" smtClean="0"/>
+              <a:rPr lang="en-US"/>
               <a:t>Fifth level</a:t>
             </a:r>
-            <a:endParaRPr lang="en-US"/>
           </a:p>
         </p:txBody>
       </p:sp>
@@ -1713,38 +1733,37 @@
           <a:p>
             <a:pPr lvl="0"/>
             <a:r>
-              <a:rPr lang="en-US" smtClean="0"/>
+              <a:rPr lang="en-US"/>
               <a:t>Click to edit Master text styles</a:t>
             </a:r>
           </a:p>
           <a:p>
             <a:pPr lvl="1"/>
             <a:r>
-              <a:rPr lang="en-US" smtClean="0"/>
+              <a:rPr lang="en-US"/>
               <a:t>Second level</a:t>
             </a:r>
           </a:p>
           <a:p>
             <a:pPr lvl="2"/>
             <a:r>
-              <a:rPr lang="en-US" smtClean="0"/>
+              <a:rPr lang="en-US"/>
               <a:t>Third level</a:t>
             </a:r>
           </a:p>
           <a:p>
             <a:pPr lvl="3"/>
             <a:r>
-              <a:rPr lang="en-US" smtClean="0"/>
+              <a:rPr lang="en-US"/>
               <a:t>Fourth level</a:t>
             </a:r>
           </a:p>
           <a:p>
             <a:pPr lvl="4"/>
             <a:r>
-              <a:rPr lang="en-US" smtClean="0"/>
+              <a:rPr lang="en-US"/>
               <a:t>Fifth level</a:t>
             </a:r>
-            <a:endParaRPr lang="en-US"/>
           </a:p>
         </p:txBody>
       </p:sp>
@@ -1773,7 +1792,7 @@
           <a:p>
             <a:fld id="{875CF0EB-321F-0749-B37A-89BBA859503C}" type="datetimeFigureOut">
               <a:rPr lang="en-US" smtClean="0"/>
-              <a:t>06/12/17</a:t>
+              <a:t>2/18/19</a:t>
             </a:fld>
             <a:endParaRPr lang="en-US"/>
           </a:p>
@@ -1887,10 +1906,9 @@
           </a:lstStyle>
           <a:p>
             <a:r>
-              <a:rPr lang="en-US" smtClean="0"/>
+              <a:rPr lang="en-US"/>
               <a:t>Click to edit Master title style</a:t>
             </a:r>
-            <a:endParaRPr lang="en-US"/>
           </a:p>
         </p:txBody>
       </p:sp>
@@ -1953,7 +1971,7 @@
           <a:p>
             <a:pPr lvl="0"/>
             <a:r>
-              <a:rPr lang="en-US" smtClean="0"/>
+              <a:rPr lang="en-US"/>
               <a:t>Click to edit Master text styles</a:t>
             </a:r>
           </a:p>
@@ -2009,38 +2027,37 @@
           <a:p>
             <a:pPr lvl="0"/>
             <a:r>
-              <a:rPr lang="en-US" smtClean="0"/>
+              <a:rPr lang="en-US"/>
               <a:t>Click to edit Master text styles</a:t>
             </a:r>
           </a:p>
           <a:p>
             <a:pPr lvl="1"/>
             <a:r>
-              <a:rPr lang="en-US" smtClean="0"/>
+              <a:rPr lang="en-US"/>
               <a:t>Second level</a:t>
             </a:r>
           </a:p>
           <a:p>
             <a:pPr lvl="2"/>
             <a:r>
-              <a:rPr lang="en-US" smtClean="0"/>
+              <a:rPr lang="en-US"/>
               <a:t>Third level</a:t>
             </a:r>
           </a:p>
           <a:p>
             <a:pPr lvl="3"/>
             <a:r>
-              <a:rPr lang="en-US" smtClean="0"/>
+              <a:rPr lang="en-US"/>
               <a:t>Fourth level</a:t>
             </a:r>
           </a:p>
           <a:p>
             <a:pPr lvl="4"/>
             <a:r>
-              <a:rPr lang="en-US" smtClean="0"/>
+              <a:rPr lang="en-US"/>
               <a:t>Fifth level</a:t>
             </a:r>
-            <a:endParaRPr lang="en-US"/>
           </a:p>
         </p:txBody>
       </p:sp>
@@ -2103,7 +2120,7 @@
           <a:p>
             <a:pPr lvl="0"/>
             <a:r>
-              <a:rPr lang="en-US" smtClean="0"/>
+              <a:rPr lang="en-US"/>
               <a:t>Click to edit Master text styles</a:t>
             </a:r>
           </a:p>
@@ -2159,38 +2176,37 @@
           <a:p>
             <a:pPr lvl="0"/>
             <a:r>
-              <a:rPr lang="en-US" smtClean="0"/>
+              <a:rPr lang="en-US"/>
               <a:t>Click to edit Master text styles</a:t>
             </a:r>
           </a:p>
           <a:p>
             <a:pPr lvl="1"/>
             <a:r>
-              <a:rPr lang="en-US" smtClean="0"/>
+              <a:rPr lang="en-US"/>
               <a:t>Second level</a:t>
             </a:r>
           </a:p>
           <a:p>
             <a:pPr lvl="2"/>
             <a:r>
-              <a:rPr lang="en-US" smtClean="0"/>
+              <a:rPr lang="en-US"/>
               <a:t>Third level</a:t>
             </a:r>
           </a:p>
           <a:p>
             <a:pPr lvl="3"/>
             <a:r>
-              <a:rPr lang="en-US" smtClean="0"/>
+              <a:rPr lang="en-US"/>
               <a:t>Fourth level</a:t>
             </a:r>
           </a:p>
           <a:p>
             <a:pPr lvl="4"/>
             <a:r>
-              <a:rPr lang="en-US" smtClean="0"/>
+              <a:rPr lang="en-US"/>
               <a:t>Fifth level</a:t>
             </a:r>
-            <a:endParaRPr lang="en-US"/>
           </a:p>
         </p:txBody>
       </p:sp>
@@ -2219,7 +2235,7 @@
           <a:p>
             <a:fld id="{875CF0EB-321F-0749-B37A-89BBA859503C}" type="datetimeFigureOut">
               <a:rPr lang="en-US" smtClean="0"/>
-              <a:t>06/12/17</a:t>
+              <a:t>2/18/19</a:t>
             </a:fld>
             <a:endParaRPr lang="en-US"/>
           </a:p>
@@ -2329,10 +2345,9 @@
           <a:lstStyle/>
           <a:p>
             <a:r>
-              <a:rPr lang="en-US" smtClean="0"/>
+              <a:rPr lang="en-US"/>
               <a:t>Click to edit Master title style</a:t>
             </a:r>
-            <a:endParaRPr lang="en-US"/>
           </a:p>
         </p:txBody>
       </p:sp>
@@ -2361,7 +2376,7 @@
           <a:p>
             <a:fld id="{875CF0EB-321F-0749-B37A-89BBA859503C}" type="datetimeFigureOut">
               <a:rPr lang="en-US" smtClean="0"/>
-              <a:t>06/12/17</a:t>
+              <a:t>2/18/19</a:t>
             </a:fld>
             <a:endParaRPr lang="en-US"/>
           </a:p>
@@ -2480,7 +2495,7 @@
           <a:p>
             <a:fld id="{875CF0EB-321F-0749-B37A-89BBA859503C}" type="datetimeFigureOut">
               <a:rPr lang="en-US" smtClean="0"/>
-              <a:t>06/12/17</a:t>
+              <a:t>2/18/19</a:t>
             </a:fld>
             <a:endParaRPr lang="en-US"/>
           </a:p>
@@ -2599,10 +2614,9 @@
           </a:lstStyle>
           <a:p>
             <a:r>
-              <a:rPr lang="en-US" smtClean="0"/>
+              <a:rPr lang="en-US"/>
               <a:t>Click to edit Master title style</a:t>
             </a:r>
-            <a:endParaRPr lang="en-US"/>
           </a:p>
         </p:txBody>
       </p:sp>
@@ -2656,38 +2670,37 @@
           <a:p>
             <a:pPr lvl="0"/>
             <a:r>
-              <a:rPr lang="en-US" smtClean="0"/>
+              <a:rPr lang="en-US"/>
               <a:t>Click to edit Master text styles</a:t>
             </a:r>
           </a:p>
           <a:p>
             <a:pPr lvl="1"/>
             <a:r>
-              <a:rPr lang="en-US" smtClean="0"/>
+              <a:rPr lang="en-US"/>
               <a:t>Second level</a:t>
             </a:r>
           </a:p>
           <a:p>
             <a:pPr lvl="2"/>
             <a:r>
-              <a:rPr lang="en-US" smtClean="0"/>
+              <a:rPr lang="en-US"/>
               <a:t>Third level</a:t>
             </a:r>
           </a:p>
           <a:p>
             <a:pPr lvl="3"/>
             <a:r>
-              <a:rPr lang="en-US" smtClean="0"/>
+              <a:rPr lang="en-US"/>
               <a:t>Fourth level</a:t>
             </a:r>
           </a:p>
           <a:p>
             <a:pPr lvl="4"/>
             <a:r>
-              <a:rPr lang="en-US" smtClean="0"/>
+              <a:rPr lang="en-US"/>
               <a:t>Fifth level</a:t>
             </a:r>
-            <a:endParaRPr lang="en-US"/>
           </a:p>
         </p:txBody>
       </p:sp>
@@ -2750,7 +2763,7 @@
           <a:p>
             <a:pPr lvl="0"/>
             <a:r>
-              <a:rPr lang="en-US" smtClean="0"/>
+              <a:rPr lang="en-US"/>
               <a:t>Click to edit Master text styles</a:t>
             </a:r>
           </a:p>
@@ -2781,7 +2794,7 @@
           <a:p>
             <a:fld id="{875CF0EB-321F-0749-B37A-89BBA859503C}" type="datetimeFigureOut">
               <a:rPr lang="en-US" smtClean="0"/>
-              <a:t>06/12/17</a:t>
+              <a:t>2/18/19</a:t>
             </a:fld>
             <a:endParaRPr lang="en-US"/>
           </a:p>
@@ -2900,10 +2913,9 @@
           </a:lstStyle>
           <a:p>
             <a:r>
-              <a:rPr lang="en-US" smtClean="0"/>
+              <a:rPr lang="en-US"/>
               <a:t>Click to edit Master title style</a:t>
             </a:r>
-            <a:endParaRPr lang="en-US"/>
           </a:p>
         </p:txBody>
       </p:sp>
@@ -3027,7 +3039,7 @@
           <a:p>
             <a:pPr lvl="0"/>
             <a:r>
-              <a:rPr lang="en-US" smtClean="0"/>
+              <a:rPr lang="en-US"/>
               <a:t>Click to edit Master text styles</a:t>
             </a:r>
           </a:p>
@@ -3058,7 +3070,7 @@
           <a:p>
             <a:fld id="{875CF0EB-321F-0749-B37A-89BBA859503C}" type="datetimeFigureOut">
               <a:rPr lang="en-US" smtClean="0"/>
-              <a:t>06/12/17</a:t>
+              <a:t>2/18/19</a:t>
             </a:fld>
             <a:endParaRPr lang="en-US"/>
           </a:p>
@@ -3183,10 +3195,9 @@
           <a:lstStyle/>
           <a:p>
             <a:r>
-              <a:rPr lang="en-US" dirty="0" smtClean="0"/>
+              <a:rPr lang="en-US" dirty="0"/>
               <a:t>Click to edit Master title style</a:t>
             </a:r>
-            <a:endParaRPr lang="en-US" dirty="0"/>
           </a:p>
         </p:txBody>
       </p:sp>
@@ -3217,38 +3228,37 @@
           <a:p>
             <a:pPr lvl="0"/>
             <a:r>
-              <a:rPr lang="en-US" dirty="0" smtClean="0"/>
+              <a:rPr lang="en-US" dirty="0"/>
               <a:t>Click to edit Master text styles</a:t>
             </a:r>
           </a:p>
           <a:p>
             <a:pPr lvl="1"/>
             <a:r>
-              <a:rPr lang="en-US" dirty="0" smtClean="0"/>
+              <a:rPr lang="en-US" dirty="0"/>
               <a:t>Second level</a:t>
             </a:r>
           </a:p>
           <a:p>
             <a:pPr lvl="2"/>
             <a:r>
-              <a:rPr lang="en-US" dirty="0" smtClean="0"/>
+              <a:rPr lang="en-US" dirty="0"/>
               <a:t>Third level</a:t>
             </a:r>
           </a:p>
           <a:p>
             <a:pPr lvl="3"/>
             <a:r>
-              <a:rPr lang="en-US" dirty="0" smtClean="0"/>
+              <a:rPr lang="en-US" dirty="0"/>
               <a:t>Fourth level</a:t>
             </a:r>
           </a:p>
           <a:p>
             <a:pPr lvl="4"/>
             <a:r>
-              <a:rPr lang="en-US" dirty="0" smtClean="0"/>
+              <a:rPr lang="en-US" dirty="0"/>
               <a:t>Fifth level</a:t>
             </a:r>
-            <a:endParaRPr lang="en-US" dirty="0"/>
           </a:p>
         </p:txBody>
       </p:sp>
@@ -3274,14 +3284,14 @@
           </a:ln>
           <a:extLst>
             <a:ext uri="{909E8E84-426E-40dd-AFC4-6F175D3DCCD1}">
-              <a14:hiddenFill xmlns:a14="http://schemas.microsoft.com/office/drawing/2010/main">
+              <a14:hiddenFill xmlns:a14="http://schemas.microsoft.com/office/drawing/2010/main" xmlns="">
                 <a:solidFill>
                   <a:srgbClr val="FFFFFF"/>
                 </a:solidFill>
               </a14:hiddenFill>
             </a:ext>
             <a:ext uri="{91240B29-F687-4f45-9708-019B960494DF}">
-              <a14:hiddenLine xmlns:a14="http://schemas.microsoft.com/office/drawing/2010/main" w="9525">
+              <a14:hiddenLine xmlns:a14="http://schemas.microsoft.com/office/drawing/2010/main" xmlns="" w="9525">
                 <a:solidFill>
                   <a:srgbClr val="000000"/>
                 </a:solidFill>
@@ -3435,7 +3445,7 @@
               <a:defRPr/>
             </a:pPr>
             <a:r>
-              <a:rPr lang="en-US" sz="700" dirty="0" smtClean="0">
+              <a:rPr lang="en-US" sz="700" dirty="0">
                 <a:latin typeface="Montserrat"/>
               </a:rPr>
               <a:t>© Paul Fremantle 2015.  This work is licensed under a Creative Commons</a:t>
@@ -3446,55 +3456,55 @@
               <a:defRPr/>
             </a:pPr>
             <a:r>
-              <a:rPr lang="en-US" sz="700" dirty="0" smtClean="0">
+              <a:rPr lang="en-US" sz="700" dirty="0">
                 <a:latin typeface="Montserrat"/>
               </a:rPr>
               <a:t> Attribution-</a:t>
             </a:r>
             <a:r>
-              <a:rPr lang="en-US" sz="700" dirty="0" err="1" smtClean="0">
+              <a:rPr lang="en-US" sz="700" dirty="0" err="1">
                 <a:latin typeface="Montserrat"/>
               </a:rPr>
               <a:t>NonCommercial</a:t>
             </a:r>
             <a:r>
-              <a:rPr lang="en-US" sz="700" dirty="0" smtClean="0">
+              <a:rPr lang="en-US" sz="700" dirty="0">
                 <a:latin typeface="Montserrat"/>
               </a:rPr>
               <a:t>-</a:t>
             </a:r>
             <a:r>
-              <a:rPr lang="en-US" sz="700" dirty="0" err="1" smtClean="0">
+              <a:rPr lang="en-US" sz="700" dirty="0" err="1">
                 <a:latin typeface="Montserrat"/>
               </a:rPr>
               <a:t>ShareAlike</a:t>
             </a:r>
             <a:r>
-              <a:rPr lang="en-US" sz="700" dirty="0" smtClean="0">
+              <a:rPr lang="en-US" sz="700" dirty="0">
                 <a:latin typeface="Montserrat"/>
               </a:rPr>
               <a:t> 4.0 International License</a:t>
             </a:r>
             <a:br>
-              <a:rPr lang="en-US" sz="700" dirty="0" smtClean="0">
+              <a:rPr lang="en-US" sz="700" dirty="0">
                 <a:latin typeface="Montserrat"/>
               </a:rPr>
             </a:br>
             <a:r>
-              <a:rPr lang="en-US" sz="700" dirty="0" smtClean="0">
+              <a:rPr lang="en-US" sz="700" dirty="0">
                 <a:latin typeface="Montserrat"/>
               </a:rPr>
               <a:t>See  </a:t>
             </a:r>
             <a:r>
-              <a:rPr lang="en-US" sz="700" dirty="0" smtClean="0">
+              <a:rPr lang="en-US" sz="700" dirty="0">
                 <a:latin typeface="Montserrat"/>
                 <a:hlinkClick r:id="rId13"/>
               </a:rPr>
               <a:t>http://creativecommons.org/licenses/by-nc-sa/4.0/</a:t>
             </a:r>
             <a:r>
-              <a:rPr lang="en-US" sz="700" dirty="0" smtClean="0">
+              <a:rPr lang="en-US" sz="700" dirty="0">
                 <a:latin typeface="Montserrat"/>
               </a:rPr>
               <a:t> </a:t>
@@ -3835,14 +3845,14 @@
           <a:noFill/>
           <a:extLst>
             <a:ext uri="{909E8E84-426E-40dd-AFC4-6F175D3DCCD1}">
-              <a14:hiddenFill xmlns:a14="http://schemas.microsoft.com/office/drawing/2010/main">
+              <a14:hiddenFill xmlns:a14="http://schemas.microsoft.com/office/drawing/2010/main" xmlns="">
                 <a:solidFill>
                   <a:srgbClr val="FFFFFF"/>
                 </a:solidFill>
               </a14:hiddenFill>
             </a:ext>
             <a:ext uri="{91240B29-F687-4f45-9708-019B960494DF}">
-              <a14:hiddenLine xmlns:a14="http://schemas.microsoft.com/office/drawing/2010/main" w="9525">
+              <a14:hiddenLine xmlns:a14="http://schemas.microsoft.com/office/drawing/2010/main" xmlns="" w="9525">
                 <a:solidFill>
                   <a:srgbClr val="000000"/>
                 </a:solidFill>
@@ -3864,33 +3874,26 @@
           <a:p>
             <a:pPr eaLnBrk="1" hangingPunct="1"/>
             <a:r>
-              <a:rPr lang="en-US" sz="4000" dirty="0" smtClean="0">
+              <a:rPr lang="en-US" sz="4000" dirty="0">
                 <a:ea typeface="ヒラギノ角ゴ ProN W3" charset="0"/>
                 <a:cs typeface="ヒラギノ角ゴ ProN W3" charset="0"/>
               </a:rPr>
               <a:t>Big Data Engineering </a:t>
             </a:r>
             <a:br>
-              <a:rPr lang="en-US" sz="4000" dirty="0" smtClean="0">
+              <a:rPr lang="en-US" sz="4000" dirty="0">
                 <a:ea typeface="ヒラギノ角ゴ ProN W3" charset="0"/>
                 <a:cs typeface="ヒラギノ角ゴ ProN W3" charset="0"/>
               </a:rPr>
             </a:br>
-            <a:r>
-              <a:rPr lang="en-US" sz="4000" dirty="0" smtClean="0">
-                <a:ea typeface="ヒラギノ角ゴ ProN W3" charset="0"/>
-                <a:cs typeface="ヒラギノ角ゴ ProN W3" charset="0"/>
-              </a:rPr>
-              <a:t/>
-            </a:r>
             <a:br>
-              <a:rPr lang="en-US" sz="4000" dirty="0" smtClean="0">
+              <a:rPr lang="en-US" sz="4000" dirty="0">
                 <a:ea typeface="ヒラギノ角ゴ ProN W3" charset="0"/>
                 <a:cs typeface="ヒラギノ角ゴ ProN W3" charset="0"/>
               </a:rPr>
             </a:br>
             <a:r>
-              <a:rPr lang="en-US" sz="4000" dirty="0" smtClean="0">
+              <a:rPr lang="en-US" sz="4000" dirty="0">
                 <a:ea typeface="ヒラギノ角ゴ ProN W3" charset="0"/>
                 <a:cs typeface="ヒラギノ角ゴ ProN W3" charset="0"/>
               </a:rPr>
@@ -3913,21 +3916,6 @@
   <p:clrMapOvr>
     <a:masterClrMapping/>
   </p:clrMapOvr>
-  <mc:AlternateContent xmlns:mc="http://schemas.openxmlformats.org/markup-compatibility/2006" xmlns:p14="http://schemas.microsoft.com/office/powerpoint/2010/main">
-    <mc:Choice Requires="p14">
-      <p:transition spd="slow" p14:dur="2000"/>
-    </mc:Choice>
-    <mc:Fallback xmlns="">
-      <p:transition xmlns:p14="http://schemas.microsoft.com/office/powerpoint/2010/main" spd="slow"/>
-    </mc:Fallback>
-  </mc:AlternateContent>
-  <p:timing>
-    <p:tnLst>
-      <p:par>
-        <p:cTn xmlns:p14="http://schemas.microsoft.com/office/powerpoint/2010/main" id="1" dur="indefinite" restart="never" nodeType="tmRoot"/>
-      </p:par>
-    </p:tnLst>
-  </p:timing>
 </p:sld>
 </file>
 
@@ -3964,10 +3952,9 @@
           <a:lstStyle/>
           <a:p>
             <a:r>
-              <a:rPr lang="en-US" dirty="0" smtClean="0"/>
+              <a:rPr lang="en-US" dirty="0"/>
               <a:t>Using Spark Packages</a:t>
             </a:r>
-            <a:endParaRPr lang="en-US" dirty="0"/>
           </a:p>
         </p:txBody>
       </p:sp>
@@ -3990,7 +3977,7 @@
               <a:buNone/>
             </a:pPr>
             <a:r>
-              <a:rPr lang="en-US" dirty="0" smtClean="0"/>
+              <a:rPr lang="en-US" dirty="0"/>
               <a:t>Automatic download from the web:</a:t>
             </a:r>
           </a:p>
@@ -4004,33 +3991,24 @@
             <a:pPr marL="0" indent="0">
               <a:buNone/>
             </a:pPr>
-            <a:endParaRPr lang="en-US" dirty="0" smtClean="0"/>
+            <a:endParaRPr lang="en-US" dirty="0"/>
           </a:p>
           <a:p>
             <a:pPr marL="0" indent="0">
               <a:buNone/>
             </a:pPr>
             <a:r>
-              <a:rPr lang="en-US" sz="2400" dirty="0" smtClean="0"/>
-              <a:t>bin</a:t>
-            </a:r>
-            <a:r>
               <a:rPr lang="en-US" sz="2400" dirty="0"/>
-              <a:t>/spark-shell </a:t>
-            </a:r>
-            <a:endParaRPr lang="en-US" sz="2400" dirty="0" smtClean="0"/>
+              <a:t>bin/spark-shell </a:t>
+            </a:r>
           </a:p>
           <a:p>
             <a:pPr marL="457200" lvl="1" indent="0">
               <a:buNone/>
             </a:pPr>
             <a:r>
-              <a:rPr lang="en-US" sz="2400" dirty="0" smtClean="0"/>
-              <a:t>-</a:t>
-            </a:r>
-            <a:r>
               <a:rPr lang="en-US" sz="2400" dirty="0"/>
-              <a:t>-packages com.databricks:spark-csv_2.11:1.2.0</a:t>
+              <a:t>--packages com.databricks:spark-csv_2.11:1.2.0</a:t>
             </a:r>
           </a:p>
         </p:txBody>
@@ -4045,13 +4023,6 @@
   <p:clrMapOvr>
     <a:masterClrMapping/>
   </p:clrMapOvr>
-  <p:timing>
-    <p:tnLst>
-      <p:par>
-        <p:cTn xmlns:p14="http://schemas.microsoft.com/office/powerpoint/2010/main" id="1" dur="indefinite" restart="never" nodeType="tmRoot"/>
-      </p:par>
-    </p:tnLst>
-  </p:timing>
 </p:sld>
 </file>
 
@@ -4088,10 +4059,9 @@
           <a:lstStyle/>
           <a:p>
             <a:r>
-              <a:rPr lang="en-US" dirty="0" smtClean="0"/>
+              <a:rPr lang="en-US" dirty="0"/>
               <a:t>Locality</a:t>
             </a:r>
-            <a:endParaRPr lang="en-US" dirty="0"/>
           </a:p>
         </p:txBody>
       </p:sp>
@@ -4111,31 +4081,30 @@
           <a:lstStyle/>
           <a:p>
             <a:r>
-              <a:rPr lang="en-US" dirty="0" smtClean="0"/>
+              <a:rPr lang="en-US" dirty="0"/>
               <a:t>Spark understands the locality of data:</a:t>
             </a:r>
           </a:p>
           <a:p>
             <a:pPr lvl="1"/>
             <a:r>
-              <a:rPr lang="en-US" dirty="0" smtClean="0"/>
+              <a:rPr lang="en-US" dirty="0"/>
               <a:t>Already in memory</a:t>
             </a:r>
           </a:p>
           <a:p>
             <a:pPr lvl="1"/>
             <a:r>
-              <a:rPr lang="en-US" dirty="0" smtClean="0"/>
+              <a:rPr lang="en-US" dirty="0"/>
               <a:t>HDFS location</a:t>
             </a:r>
           </a:p>
           <a:p>
             <a:pPr lvl="1"/>
             <a:r>
-              <a:rPr lang="en-US" dirty="0" smtClean="0"/>
+              <a:rPr lang="en-US" dirty="0"/>
               <a:t>Cassandra location</a:t>
             </a:r>
-            <a:endParaRPr lang="en-US" dirty="0"/>
           </a:p>
         </p:txBody>
       </p:sp>
@@ -4149,13 +4118,6 @@
   <p:clrMapOvr>
     <a:masterClrMapping/>
   </p:clrMapOvr>
-  <p:timing>
-    <p:tnLst>
-      <p:par>
-        <p:cTn xmlns:p14="http://schemas.microsoft.com/office/powerpoint/2010/main" id="1" dur="indefinite" restart="never" nodeType="tmRoot"/>
-      </p:par>
-    </p:tnLst>
-  </p:timing>
 </p:sld>
 </file>
 
@@ -4192,10 +4154,9 @@
           <a:lstStyle/>
           <a:p>
             <a:r>
-              <a:rPr lang="en-US" dirty="0" smtClean="0"/>
+              <a:rPr lang="en-US" dirty="0"/>
               <a:t>Spark Extras</a:t>
             </a:r>
-            <a:endParaRPr lang="en-US" dirty="0"/>
           </a:p>
         </p:txBody>
       </p:sp>
@@ -4234,14 +4195,11 @@
           <a:p>
             <a:pPr algn="ctr"/>
             <a:r>
-              <a:rPr lang="en-US" sz="2800" dirty="0" smtClean="0">
+              <a:rPr lang="en-US" sz="2800" dirty="0">
                 <a:latin typeface="Montserrat"/>
               </a:rPr>
               <a:t>Spark Core</a:t>
             </a:r>
-            <a:endParaRPr lang="en-US" sz="2800" dirty="0">
-              <a:latin typeface="Montserrat"/>
-            </a:endParaRPr>
           </a:p>
         </p:txBody>
       </p:sp>
@@ -4280,7 +4238,7 @@
           <a:p>
             <a:pPr algn="ctr"/>
             <a:r>
-              <a:rPr lang="en-US" sz="1400" dirty="0" smtClean="0">
+              <a:rPr lang="en-US" sz="1400" dirty="0">
                 <a:latin typeface="Montserrat"/>
               </a:rPr>
               <a:t>Spark </a:t>
@@ -4289,14 +4247,11 @@
           <a:p>
             <a:pPr algn="ctr"/>
             <a:r>
-              <a:rPr lang="en-US" sz="1400" dirty="0" smtClean="0">
+              <a:rPr lang="en-US" sz="1400" dirty="0">
                 <a:latin typeface="Montserrat"/>
               </a:rPr>
               <a:t>SQL</a:t>
             </a:r>
-            <a:endParaRPr lang="en-US" sz="1400" dirty="0">
-              <a:latin typeface="Montserrat"/>
-            </a:endParaRPr>
           </a:p>
         </p:txBody>
       </p:sp>
@@ -4335,14 +4290,11 @@
           <a:p>
             <a:pPr algn="ctr"/>
             <a:r>
-              <a:rPr lang="en-US" sz="1400" dirty="0" smtClean="0">
+              <a:rPr lang="en-US" sz="1400" dirty="0">
                 <a:latin typeface="Montserrat"/>
               </a:rPr>
               <a:t>Spark Streaming</a:t>
             </a:r>
-            <a:endParaRPr lang="en-US" sz="1400" dirty="0">
-              <a:latin typeface="Montserrat"/>
-            </a:endParaRPr>
           </a:p>
         </p:txBody>
       </p:sp>
@@ -4381,7 +4333,7 @@
           <a:p>
             <a:pPr algn="ctr"/>
             <a:r>
-              <a:rPr lang="en-US" sz="1400" dirty="0" smtClean="0">
+              <a:rPr lang="en-US" sz="1400" dirty="0">
                 <a:latin typeface="Montserrat"/>
               </a:rPr>
               <a:t>Spark</a:t>
@@ -4390,7 +4342,7 @@
           <a:p>
             <a:pPr algn="ctr"/>
             <a:r>
-              <a:rPr lang="en-US" sz="1400" dirty="0" smtClean="0">
+              <a:rPr lang="en-US" sz="1400" dirty="0">
                 <a:latin typeface="Montserrat"/>
               </a:rPr>
               <a:t>MLlib	</a:t>
@@ -4433,7 +4385,7 @@
           <a:p>
             <a:pPr algn="ctr"/>
             <a:r>
-              <a:rPr lang="en-US" sz="1400" dirty="0" err="1" smtClean="0">
+              <a:rPr lang="en-US" sz="1400" dirty="0" err="1">
                 <a:latin typeface="Montserrat"/>
               </a:rPr>
               <a:t>SparkR</a:t>
@@ -4479,7 +4431,7 @@
           <a:p>
             <a:pPr algn="ctr"/>
             <a:r>
-              <a:rPr lang="en-US" sz="1400" dirty="0" err="1" smtClean="0">
+              <a:rPr lang="en-US" sz="1400" dirty="0" err="1">
                 <a:latin typeface="Montserrat"/>
               </a:rPr>
               <a:t>GraphX</a:t>
@@ -4500,13 +4452,6 @@
   <p:clrMapOvr>
     <a:masterClrMapping/>
   </p:clrMapOvr>
-  <p:timing>
-    <p:tnLst>
-      <p:par>
-        <p:cTn xmlns:p14="http://schemas.microsoft.com/office/powerpoint/2010/main" id="1" dur="indefinite" restart="never" nodeType="tmRoot"/>
-      </p:par>
-    </p:tnLst>
-  </p:timing>
 </p:sld>
 </file>
 
@@ -4543,10 +4488,9 @@
           <a:lstStyle/>
           <a:p>
             <a:r>
-              <a:rPr lang="en-US" dirty="0" smtClean="0"/>
+              <a:rPr lang="en-US" dirty="0"/>
               <a:t>Spark Extras</a:t>
             </a:r>
-            <a:endParaRPr lang="en-US" dirty="0"/>
           </a:p>
         </p:txBody>
       </p:sp>
@@ -4568,67 +4512,66 @@
           <a:lstStyle/>
           <a:p>
             <a:r>
-              <a:rPr lang="en-US" dirty="0" smtClean="0"/>
+              <a:rPr lang="en-US" dirty="0"/>
               <a:t>Spark Streaming	</a:t>
             </a:r>
           </a:p>
           <a:p>
             <a:pPr lvl="1"/>
             <a:r>
-              <a:rPr lang="en-US" dirty="0" err="1" smtClean="0"/>
+              <a:rPr lang="en-US" dirty="0" err="1"/>
               <a:t>Realtime</a:t>
             </a:r>
             <a:r>
-              <a:rPr lang="en-US" dirty="0" smtClean="0"/>
+              <a:rPr lang="en-US" dirty="0"/>
               <a:t> analysis in Spark</a:t>
             </a:r>
           </a:p>
           <a:p>
             <a:r>
-              <a:rPr lang="en-US" dirty="0" smtClean="0"/>
+              <a:rPr lang="en-US" dirty="0"/>
               <a:t>Spark </a:t>
             </a:r>
             <a:r>
-              <a:rPr lang="en-US" dirty="0" err="1" smtClean="0"/>
+              <a:rPr lang="en-US" dirty="0" err="1"/>
               <a:t>MLLib</a:t>
             </a:r>
-            <a:endParaRPr lang="en-US" dirty="0" smtClean="0"/>
+            <a:endParaRPr lang="en-US" dirty="0"/>
           </a:p>
           <a:p>
             <a:pPr lvl="1"/>
             <a:r>
-              <a:rPr lang="en-US" dirty="0" smtClean="0"/>
+              <a:rPr lang="en-US" dirty="0"/>
               <a:t>Like Mahout – Machine learning in Spark</a:t>
             </a:r>
           </a:p>
           <a:p>
             <a:r>
-              <a:rPr lang="en-US" dirty="0" err="1" smtClean="0"/>
+              <a:rPr lang="en-US" dirty="0" err="1"/>
               <a:t>GraphX</a:t>
             </a:r>
-            <a:endParaRPr lang="en-US" dirty="0" smtClean="0"/>
+            <a:endParaRPr lang="en-US" dirty="0"/>
           </a:p>
           <a:p>
             <a:pPr lvl="1"/>
             <a:r>
-              <a:rPr lang="en-US" dirty="0" smtClean="0"/>
+              <a:rPr lang="en-US" dirty="0"/>
               <a:t>Graph processing in Spark</a:t>
             </a:r>
           </a:p>
           <a:p>
             <a:r>
-              <a:rPr lang="en-US" dirty="0" err="1" smtClean="0"/>
+              <a:rPr lang="en-US" dirty="0" err="1"/>
               <a:t>SparkR</a:t>
             </a:r>
-            <a:endParaRPr lang="en-US" dirty="0" smtClean="0"/>
+            <a:endParaRPr lang="en-US" dirty="0"/>
           </a:p>
           <a:p>
             <a:pPr lvl="1"/>
             <a:r>
-              <a:rPr lang="en-US" dirty="0" smtClean="0"/>
+              <a:rPr lang="en-US" dirty="0"/>
               <a:t>R statistical analysis on Spark</a:t>
             </a:r>
-            <a:endParaRPr lang="en-US" dirty="0"/>
           </a:p>
         </p:txBody>
       </p:sp>
@@ -4642,13 +4585,6 @@
   <p:clrMapOvr>
     <a:masterClrMapping/>
   </p:clrMapOvr>
-  <p:timing>
-    <p:tnLst>
-      <p:par>
-        <p:cTn xmlns:p14="http://schemas.microsoft.com/office/powerpoint/2010/main" id="1" dur="indefinite" restart="never" nodeType="tmRoot"/>
-      </p:par>
-    </p:tnLst>
-  </p:timing>
 </p:sld>
 </file>
 
@@ -4685,10 +4621,9 @@
           <a:lstStyle/>
           <a:p>
             <a:r>
-              <a:rPr lang="en-US" dirty="0" smtClean="0"/>
+              <a:rPr lang="en-US" dirty="0"/>
               <a:t>Spark MLlib</a:t>
             </a:r>
-            <a:endParaRPr lang="en-US" dirty="0"/>
           </a:p>
         </p:txBody>
       </p:sp>
@@ -4710,32 +4645,32 @@
           <a:lstStyle/>
           <a:p>
             <a:r>
-              <a:rPr lang="en-US" dirty="0" smtClean="0"/>
+              <a:rPr lang="en-US" dirty="0"/>
               <a:t>Simple stats and correlation testing</a:t>
             </a:r>
           </a:p>
           <a:p>
             <a:r>
-              <a:rPr lang="en-US" dirty="0" smtClean="0"/>
+              <a:rPr lang="en-US" dirty="0"/>
               <a:t>Classification and regression</a:t>
             </a:r>
           </a:p>
           <a:p>
             <a:r>
-              <a:rPr lang="en-US" dirty="0" smtClean="0"/>
+              <a:rPr lang="en-US" dirty="0"/>
               <a:t>Collaborative Filtering</a:t>
             </a:r>
           </a:p>
           <a:p>
             <a:pPr lvl="1"/>
             <a:r>
-              <a:rPr lang="en-US" dirty="0" smtClean="0"/>
+              <a:rPr lang="en-US" dirty="0"/>
               <a:t>Alternating Least Squares </a:t>
             </a:r>
           </a:p>
           <a:p>
             <a:r>
-              <a:rPr lang="en-US" dirty="0" smtClean="0"/>
+              <a:rPr lang="en-US" dirty="0"/>
               <a:t>Clustering</a:t>
             </a:r>
           </a:p>
@@ -4743,30 +4678,25 @@
             <a:pPr lvl="1"/>
             <a:r>
               <a:rPr lang="en-US" dirty="0"/>
-              <a:t>k</a:t>
-            </a:r>
-            <a:r>
-              <a:rPr lang="en-US" dirty="0" smtClean="0"/>
-              <a:t>-means, </a:t>
-            </a:r>
-            <a:r>
-              <a:rPr lang="en-US" dirty="0" err="1" smtClean="0"/>
+              <a:t>k-means, </a:t>
+            </a:r>
+            <a:r>
+              <a:rPr lang="en-US" dirty="0" err="1"/>
               <a:t>etc</a:t>
             </a:r>
-            <a:endParaRPr lang="en-US" dirty="0" smtClean="0"/>
-          </a:p>
-          <a:p>
-            <a:r>
-              <a:rPr lang="en-US" dirty="0" smtClean="0"/>
+            <a:endParaRPr lang="en-US" dirty="0"/>
+          </a:p>
+          <a:p>
+            <a:r>
+              <a:rPr lang="en-US" dirty="0"/>
               <a:t>Frequent Pattern Mining</a:t>
             </a:r>
           </a:p>
           <a:p>
             <a:r>
-              <a:rPr lang="en-US" dirty="0" smtClean="0"/>
+              <a:rPr lang="en-US" dirty="0"/>
               <a:t>Plus more</a:t>
             </a:r>
-            <a:endParaRPr lang="en-US" dirty="0"/>
           </a:p>
         </p:txBody>
       </p:sp>
@@ -4780,13 +4710,6 @@
   <p:clrMapOvr>
     <a:masterClrMapping/>
   </p:clrMapOvr>
-  <p:timing>
-    <p:tnLst>
-      <p:par>
-        <p:cTn xmlns:p14="http://schemas.microsoft.com/office/powerpoint/2010/main" id="1" dur="indefinite" restart="never" nodeType="tmRoot"/>
-      </p:par>
-    </p:tnLst>
-  </p:timing>
 </p:sld>
 </file>
 
@@ -4823,10 +4746,9 @@
           <a:lstStyle/>
           <a:p>
             <a:r>
-              <a:rPr lang="en-US" dirty="0" smtClean="0"/>
+              <a:rPr lang="en-US" dirty="0"/>
               <a:t>MLlib example</a:t>
             </a:r>
-            <a:endParaRPr lang="en-US" dirty="0"/>
           </a:p>
         </p:txBody>
       </p:sp>
@@ -5046,17 +4968,10 @@
                 <a:latin typeface="Lucida Console"/>
                 <a:cs typeface="Lucida Console"/>
               </a:rPr>
-              <a:t>=0.2, </a:t>
-            </a:r>
-            <a:r>
-              <a:rPr lang="en-US" sz="1600" dirty="0" smtClean="0">
-                <a:latin typeface="Lucida Console"/>
-                <a:cs typeface="Lucida Console"/>
-              </a:rPr>
-              <a:t>	</a:t>
-            </a:r>
-            <a:r>
-              <a:rPr lang="en-US" sz="1600" dirty="0" err="1" smtClean="0">
+              <a:t>=0.2, 	</a:t>
+            </a:r>
+            <a:r>
+              <a:rPr lang="en-US" sz="1600" dirty="0" err="1">
                 <a:latin typeface="Lucida Console"/>
                 <a:cs typeface="Lucida Console"/>
               </a:rPr>
@@ -5141,13 +5056,6 @@
   <p:clrMapOvr>
     <a:masterClrMapping/>
   </p:clrMapOvr>
-  <p:timing>
-    <p:tnLst>
-      <p:par>
-        <p:cTn xmlns:p14="http://schemas.microsoft.com/office/powerpoint/2010/main" id="1" dur="indefinite" restart="never" nodeType="tmRoot"/>
-      </p:par>
-    </p:tnLst>
-  </p:timing>
 </p:sld>
 </file>
 
@@ -5184,7 +5092,7 @@
           <a:lstStyle/>
           <a:p>
             <a:r>
-              <a:rPr lang="en-US" dirty="0" err="1" smtClean="0"/>
+              <a:rPr lang="en-US" dirty="0" err="1"/>
               <a:t>GraphX</a:t>
             </a:r>
             <a:endParaRPr lang="en-US" dirty="0"/>
@@ -5207,7 +5115,7 @@
           <a:lstStyle/>
           <a:p>
             <a:r>
-              <a:rPr lang="en-US" dirty="0" smtClean="0"/>
+              <a:rPr lang="en-US" dirty="0"/>
               <a:t>  </a:t>
             </a:r>
           </a:p>
@@ -5274,13 +5182,6 @@
   <p:clrMapOvr>
     <a:masterClrMapping/>
   </p:clrMapOvr>
-  <p:timing>
-    <p:tnLst>
-      <p:par>
-        <p:cTn xmlns:p14="http://schemas.microsoft.com/office/powerpoint/2010/main" id="1" dur="indefinite" restart="never" nodeType="tmRoot"/>
-      </p:par>
-    </p:tnLst>
-  </p:timing>
 </p:sld>
 </file>
 
@@ -5317,10 +5218,9 @@
           <a:lstStyle/>
           <a:p>
             <a:r>
-              <a:rPr lang="en-US" dirty="0" smtClean="0"/>
+              <a:rPr lang="en-US" dirty="0"/>
               <a:t>R</a:t>
             </a:r>
-            <a:endParaRPr lang="en-US" dirty="0"/>
           </a:p>
         </p:txBody>
       </p:sp>
@@ -5337,41 +5237,40 @@
         <p:spPr/>
         <p:txBody>
           <a:bodyPr>
-            <a:normAutofit lnSpcReduction="10000"/>
+            <a:normAutofit/>
           </a:bodyPr>
           <a:lstStyle/>
           <a:p>
             <a:r>
-              <a:rPr lang="en-US" dirty="0" smtClean="0"/>
+              <a:rPr lang="en-US" dirty="0"/>
               <a:t> R is an open source system for statistics and graphics</a:t>
             </a:r>
           </a:p>
           <a:p>
             <a:pPr lvl="1"/>
             <a:r>
-              <a:rPr lang="en-US" dirty="0" smtClean="0"/>
+              <a:rPr lang="en-US" dirty="0"/>
               <a:t>Based on the S language from AT&amp;T Bell Labs</a:t>
             </a:r>
           </a:p>
           <a:p>
             <a:r>
-              <a:rPr lang="en-US" dirty="0" smtClean="0"/>
+              <a:rPr lang="en-US" dirty="0"/>
               <a:t>Supports a wide variety of statistical techniques and graphing tools</a:t>
             </a:r>
           </a:p>
           <a:p>
             <a:r>
-              <a:rPr lang="en-US" dirty="0" smtClean="0"/>
+              <a:rPr lang="en-US" dirty="0"/>
               <a:t>An extensible set of packages that provide extra functions via CRAN</a:t>
             </a:r>
           </a:p>
           <a:p>
             <a:pPr lvl="1"/>
             <a:r>
-              <a:rPr lang="en-US" dirty="0" smtClean="0"/>
+              <a:rPr lang="en-US" dirty="0"/>
               <a:t>The Comprehensive R Archive Network</a:t>
             </a:r>
-            <a:endParaRPr lang="en-US" dirty="0"/>
           </a:p>
         </p:txBody>
       </p:sp>
@@ -5409,13 +5308,6 @@
   <p:clrMapOvr>
     <a:masterClrMapping/>
   </p:clrMapOvr>
-  <p:timing>
-    <p:tnLst>
-      <p:par>
-        <p:cTn xmlns:p14="http://schemas.microsoft.com/office/powerpoint/2010/main" id="1" dur="indefinite" restart="never" nodeType="tmRoot"/>
-      </p:par>
-    </p:tnLst>
-  </p:timing>
 </p:sld>
 </file>
 
@@ -5452,7 +5344,7 @@
           <a:lstStyle/>
           <a:p>
             <a:r>
-              <a:rPr lang="en-US" dirty="0" err="1" smtClean="0"/>
+              <a:rPr lang="en-US" dirty="0" err="1"/>
               <a:t>SparkR</a:t>
             </a:r>
             <a:endParaRPr lang="en-US" dirty="0"/>
@@ -5475,22 +5367,21 @@
           <a:lstStyle/>
           <a:p>
             <a:r>
-              <a:rPr lang="en-US" dirty="0" smtClean="0"/>
+              <a:rPr lang="en-US" dirty="0"/>
               <a:t>A lightweight approach to use Spark from within R</a:t>
             </a:r>
           </a:p>
           <a:p>
             <a:r>
-              <a:rPr lang="en-US" dirty="0" smtClean="0"/>
+              <a:rPr lang="en-US" dirty="0"/>
               <a:t>Also works with MLlib for machine learning</a:t>
             </a:r>
           </a:p>
           <a:p>
             <a:r>
-              <a:rPr lang="en-US" dirty="0" smtClean="0"/>
+              <a:rPr lang="en-US" dirty="0"/>
               <a:t>Allows complex statistical analysis to be done on a Spark cluster </a:t>
             </a:r>
-            <a:endParaRPr lang="en-US" dirty="0"/>
           </a:p>
         </p:txBody>
       </p:sp>
@@ -5504,13 +5395,6 @@
   <p:clrMapOvr>
     <a:masterClrMapping/>
   </p:clrMapOvr>
-  <p:timing>
-    <p:tnLst>
-      <p:par>
-        <p:cTn xmlns:p14="http://schemas.microsoft.com/office/powerpoint/2010/main" id="1" dur="indefinite" restart="never" nodeType="tmRoot"/>
-      </p:par>
-    </p:tnLst>
-  </p:timing>
 </p:sld>
 </file>
 
@@ -5547,10 +5431,9 @@
           <a:lstStyle/>
           <a:p>
             <a:r>
-              <a:rPr lang="en-US" dirty="0" smtClean="0"/>
+              <a:rPr lang="en-US" dirty="0"/>
               <a:t>Apache Avro</a:t>
             </a:r>
-            <a:endParaRPr lang="en-US" dirty="0"/>
           </a:p>
         </p:txBody>
       </p:sp>
@@ -5567,63 +5450,62 @@
         <p:spPr/>
         <p:txBody>
           <a:bodyPr>
-            <a:normAutofit fontScale="92500" lnSpcReduction="10000"/>
+            <a:normAutofit fontScale="92500"/>
           </a:bodyPr>
           <a:lstStyle/>
           <a:p>
             <a:r>
-              <a:rPr lang="en-US" dirty="0" smtClean="0"/>
+              <a:rPr lang="en-US" dirty="0"/>
               <a:t>A compact data storage and transmission system</a:t>
             </a:r>
           </a:p>
           <a:p>
             <a:pPr lvl="1"/>
             <a:r>
-              <a:rPr lang="en-US" dirty="0" smtClean="0"/>
+              <a:rPr lang="en-US" dirty="0"/>
               <a:t>Uses schemas of data to ensure it can be read by the receiver</a:t>
             </a:r>
           </a:p>
           <a:p>
             <a:pPr lvl="1"/>
             <a:r>
-              <a:rPr lang="en-US" dirty="0" smtClean="0"/>
+              <a:rPr lang="en-US" dirty="0"/>
               <a:t>Supports dynamic typing</a:t>
             </a:r>
           </a:p>
           <a:p>
             <a:r>
-              <a:rPr lang="en-US" dirty="0" smtClean="0"/>
+              <a:rPr lang="en-US" dirty="0"/>
               <a:t>Used by RPC or data collection systems </a:t>
             </a:r>
           </a:p>
           <a:p>
             <a:pPr lvl="1"/>
             <a:r>
-              <a:rPr lang="en-US" dirty="0" smtClean="0"/>
+              <a:rPr lang="en-US" dirty="0"/>
               <a:t>Fast binary protocols</a:t>
             </a:r>
           </a:p>
           <a:p>
             <a:r>
-              <a:rPr lang="en-US" dirty="0" smtClean="0"/>
+              <a:rPr lang="en-US" dirty="0"/>
               <a:t>Also supports storage</a:t>
             </a:r>
           </a:p>
           <a:p>
             <a:pPr lvl="1"/>
             <a:r>
-              <a:rPr lang="en-US" dirty="0" smtClean="0"/>
+              <a:rPr lang="en-US" dirty="0"/>
               <a:t>Hence used by many Big Data apps including </a:t>
             </a:r>
             <a:r>
-              <a:rPr lang="en-US" dirty="0" err="1" smtClean="0"/>
+              <a:rPr lang="en-US" dirty="0" err="1"/>
               <a:t>Hadoop</a:t>
             </a:r>
             <a:r>
-              <a:rPr lang="en-US" dirty="0" smtClean="0"/>
+              <a:rPr lang="en-US" dirty="0"/>
               <a:t> and Spark</a:t>
             </a:r>
-            <a:endParaRPr lang="en-US" dirty="0"/>
           </a:p>
         </p:txBody>
       </p:sp>
@@ -5675,10 +5557,9 @@
           <a:lstStyle/>
           <a:p>
             <a:r>
-              <a:rPr lang="en-US" dirty="0" smtClean="0"/>
+              <a:rPr lang="en-US" dirty="0"/>
               <a:t>HDFS in a nutshell</a:t>
             </a:r>
-            <a:endParaRPr lang="en-US" dirty="0"/>
           </a:p>
         </p:txBody>
       </p:sp>
@@ -5717,10 +5598,9 @@
           <a:p>
             <a:pPr algn="ctr"/>
             <a:r>
-              <a:rPr lang="en-US" dirty="0" smtClean="0"/>
+              <a:rPr lang="en-US" dirty="0"/>
               <a:t>Client</a:t>
             </a:r>
-            <a:endParaRPr lang="en-US" dirty="0"/>
           </a:p>
         </p:txBody>
       </p:sp>
@@ -5759,7 +5639,7 @@
           <a:p>
             <a:pPr algn="ctr"/>
             <a:r>
-              <a:rPr lang="en-US" dirty="0" err="1" smtClean="0"/>
+              <a:rPr lang="en-US" dirty="0" err="1"/>
               <a:t>NameNode</a:t>
             </a:r>
             <a:endParaRPr lang="en-US" dirty="0"/>
@@ -5801,7 +5681,7 @@
           <a:p>
             <a:pPr algn="ctr"/>
             <a:r>
-              <a:rPr lang="en-US" dirty="0" err="1" smtClean="0"/>
+              <a:rPr lang="en-US" dirty="0" err="1"/>
               <a:t>DataNode</a:t>
             </a:r>
             <a:endParaRPr lang="en-US" dirty="0"/>
@@ -5843,7 +5723,7 @@
           <a:p>
             <a:pPr algn="ctr"/>
             <a:r>
-              <a:rPr lang="en-US" dirty="0" err="1" smtClean="0"/>
+              <a:rPr lang="en-US" dirty="0" err="1"/>
               <a:t>DataNode</a:t>
             </a:r>
             <a:endParaRPr lang="en-US" dirty="0"/>
@@ -5885,7 +5765,7 @@
           <a:p>
             <a:pPr algn="ctr"/>
             <a:r>
-              <a:rPr lang="en-US" dirty="0" err="1" smtClean="0"/>
+              <a:rPr lang="en-US" dirty="0" err="1"/>
               <a:t>DataNode</a:t>
             </a:r>
             <a:endParaRPr lang="en-US" dirty="0"/>
@@ -5927,7 +5807,7 @@
           <a:p>
             <a:pPr algn="ctr"/>
             <a:r>
-              <a:rPr lang="en-US" dirty="0" err="1" smtClean="0"/>
+              <a:rPr lang="en-US" dirty="0" err="1"/>
               <a:t>DataNode</a:t>
             </a:r>
             <a:endParaRPr lang="en-US" dirty="0"/>
@@ -5969,14 +5849,14 @@
           <a:p>
             <a:pPr algn="ctr"/>
             <a:r>
-              <a:rPr lang="en-US" dirty="0" smtClean="0"/>
+              <a:rPr lang="en-US" dirty="0"/>
               <a:t>Secondary</a:t>
             </a:r>
           </a:p>
           <a:p>
             <a:pPr algn="ctr"/>
             <a:r>
-              <a:rPr lang="en-US" dirty="0" err="1" smtClean="0"/>
+              <a:rPr lang="en-US" dirty="0" err="1"/>
               <a:t>NameNode</a:t>
             </a:r>
             <a:endParaRPr lang="en-US" dirty="0"/>
@@ -6301,10 +6181,9 @@
           <a:lstStyle/>
           <a:p>
             <a:r>
-              <a:rPr lang="en-US" sz="1400" dirty="0" smtClean="0"/>
+              <a:rPr lang="en-US" sz="1400" dirty="0"/>
               <a:t>metadata</a:t>
             </a:r>
-            <a:endParaRPr lang="en-US" sz="1400" dirty="0"/>
           </a:p>
         </p:txBody>
       </p:sp>
@@ -6331,10 +6210,9 @@
           <a:lstStyle/>
           <a:p>
             <a:r>
-              <a:rPr lang="en-US" sz="1400" dirty="0" smtClean="0"/>
+              <a:rPr lang="en-US" sz="1400" dirty="0"/>
               <a:t>checkpoint</a:t>
             </a:r>
-            <a:endParaRPr lang="en-US" sz="1400" dirty="0"/>
           </a:p>
         </p:txBody>
       </p:sp>
@@ -6361,10 +6239,9 @@
           <a:lstStyle/>
           <a:p>
             <a:r>
-              <a:rPr lang="en-US" sz="1400" dirty="0" smtClean="0"/>
+              <a:rPr lang="en-US" sz="1400" dirty="0"/>
               <a:t>Data access</a:t>
             </a:r>
-            <a:endParaRPr lang="en-US" sz="1400" dirty="0"/>
           </a:p>
         </p:txBody>
       </p:sp>
@@ -6414,10 +6291,9 @@
           <a:lstStyle/>
           <a:p>
             <a:r>
-              <a:rPr lang="en-US" dirty="0" smtClean="0"/>
+              <a:rPr lang="en-US" dirty="0"/>
               <a:t>Apache Parquet</a:t>
             </a:r>
-            <a:endParaRPr lang="en-US" dirty="0"/>
           </a:p>
         </p:txBody>
       </p:sp>
@@ -6444,40 +6320,40 @@
           <a:lstStyle/>
           <a:p>
             <a:r>
-              <a:rPr lang="en-US" sz="2800" dirty="0" smtClean="0"/>
+              <a:rPr lang="en-US" sz="2800" dirty="0"/>
               <a:t>Apache Parquet is a columnar data storage model </a:t>
             </a:r>
           </a:p>
           <a:p>
             <a:pPr lvl="1"/>
             <a:r>
-              <a:rPr lang="en-US" sz="2400" dirty="0" smtClean="0"/>
+              <a:rPr lang="en-US" sz="2400" dirty="0"/>
               <a:t>Works with </a:t>
             </a:r>
             <a:r>
-              <a:rPr lang="en-US" sz="2400" dirty="0" err="1" smtClean="0"/>
+              <a:rPr lang="en-US" sz="2400" dirty="0" err="1"/>
               <a:t>Hadoop</a:t>
             </a:r>
             <a:r>
-              <a:rPr lang="en-US" sz="2400" dirty="0" smtClean="0"/>
+              <a:rPr lang="en-US" sz="2400" dirty="0"/>
               <a:t>, Spark and many others</a:t>
             </a:r>
           </a:p>
           <a:p>
             <a:pPr lvl="1"/>
             <a:r>
-              <a:rPr lang="en-US" sz="2400" dirty="0" smtClean="0"/>
+              <a:rPr lang="en-US" sz="2400" dirty="0"/>
               <a:t>Efficient storage of data</a:t>
             </a:r>
           </a:p>
           <a:p>
             <a:pPr lvl="1"/>
             <a:r>
-              <a:rPr lang="en-US" sz="2400" dirty="0" smtClean="0"/>
+              <a:rPr lang="en-US" sz="2400" dirty="0"/>
               <a:t>Based on another Google system called </a:t>
             </a:r>
             <a:r>
-              <a:rPr lang="en-US" sz="2400" dirty="0" err="1" smtClean="0"/>
+              <a:rPr lang="en-US" sz="2400" dirty="0" err="1"/>
               <a:t>Dremel</a:t>
             </a:r>
             <a:endParaRPr lang="en-US" sz="2400" dirty="0"/>
@@ -6556,10 +6432,9 @@
           <a:lstStyle/>
           <a:p>
             <a:r>
-              <a:rPr lang="en-US" dirty="0" smtClean="0"/>
+              <a:rPr lang="en-US" dirty="0"/>
               <a:t>Cluster management systems for Big Data</a:t>
             </a:r>
-            <a:endParaRPr lang="en-US" dirty="0"/>
           </a:p>
         </p:txBody>
       </p:sp>
@@ -6579,66 +6454,62 @@
           <a:lstStyle/>
           <a:p>
             <a:r>
-              <a:rPr lang="en-US" dirty="0" smtClean="0"/>
+              <a:rPr lang="en-US" dirty="0"/>
               <a:t>YARN</a:t>
             </a:r>
           </a:p>
           <a:p>
             <a:pPr lvl="1"/>
             <a:r>
-              <a:rPr lang="en-US" dirty="0" smtClean="0"/>
+              <a:rPr lang="en-US" dirty="0"/>
               <a:t>Part of </a:t>
             </a:r>
             <a:r>
-              <a:rPr lang="en-US" dirty="0" err="1" smtClean="0"/>
+              <a:rPr lang="en-US" dirty="0" err="1"/>
               <a:t>Hadoop</a:t>
             </a:r>
             <a:r>
-              <a:rPr lang="en-US" dirty="0" smtClean="0"/>
+              <a:rPr lang="en-US" dirty="0"/>
               <a:t> but significantly rebuilt since </a:t>
             </a:r>
             <a:r>
-              <a:rPr lang="en-US" dirty="0" err="1" smtClean="0"/>
+              <a:rPr lang="en-US" dirty="0" err="1"/>
               <a:t>Hadoop</a:t>
             </a:r>
             <a:r>
-              <a:rPr lang="en-US" dirty="0" smtClean="0"/>
+              <a:rPr lang="en-US" dirty="0"/>
               <a:t> 1</a:t>
             </a:r>
           </a:p>
           <a:p>
             <a:r>
-              <a:rPr lang="en-US" dirty="0" err="1" smtClean="0"/>
+              <a:rPr lang="en-US" dirty="0" err="1"/>
               <a:t>Mesos</a:t>
             </a:r>
             <a:r>
-              <a:rPr lang="en-US" dirty="0" smtClean="0"/>
+              <a:rPr lang="en-US" dirty="0"/>
               <a:t>	</a:t>
             </a:r>
           </a:p>
           <a:p>
             <a:pPr lvl="1"/>
             <a:r>
-              <a:rPr lang="en-US" dirty="0" smtClean="0"/>
+              <a:rPr lang="en-US" dirty="0"/>
               <a:t>Popular Apache project</a:t>
             </a:r>
           </a:p>
           <a:p>
             <a:pPr lvl="1"/>
             <a:r>
-              <a:rPr lang="en-US" dirty="0" smtClean="0"/>
+              <a:rPr lang="en-US" dirty="0"/>
               <a:t>Built to be a resource manager for a complete datacenter</a:t>
             </a:r>
           </a:p>
           <a:p>
             <a:pPr lvl="2"/>
             <a:r>
-              <a:rPr lang="en-US" dirty="0" smtClean="0"/>
-              <a:t>Supports </a:t>
-            </a:r>
-            <a:r>
-              <a:rPr lang="en-US" dirty="0"/>
-              <a:t>many workloads (e.g. </a:t>
+              <a:rPr lang="en-US" dirty="0"/>
+              <a:t>Supports many workloads (e.g. </a:t>
             </a:r>
             <a:r>
               <a:rPr lang="en-US" dirty="0" err="1"/>
@@ -6651,7 +6522,7 @@
           </a:p>
           <a:p>
             <a:pPr lvl="1"/>
-            <a:endParaRPr lang="en-US" dirty="0" smtClean="0"/>
+            <a:endParaRPr lang="en-US" dirty="0"/>
           </a:p>
         </p:txBody>
       </p:sp>
@@ -6665,13 +6536,6 @@
   <p:clrMapOvr>
     <a:masterClrMapping/>
   </p:clrMapOvr>
-  <p:timing>
-    <p:tnLst>
-      <p:par>
-        <p:cTn xmlns:p14="http://schemas.microsoft.com/office/powerpoint/2010/main" id="1" dur="indefinite" restart="never" nodeType="tmRoot"/>
-      </p:par>
-    </p:tnLst>
-  </p:timing>
 </p:sld>
 </file>
 
@@ -6708,10 +6572,9 @@
           <a:lstStyle/>
           <a:p>
             <a:r>
-              <a:rPr lang="en-US" dirty="0" smtClean="0"/>
+              <a:rPr lang="en-US" dirty="0"/>
               <a:t>What is YARN?</a:t>
             </a:r>
-            <a:endParaRPr lang="en-US" dirty="0"/>
           </a:p>
         </p:txBody>
       </p:sp>
@@ -6731,39 +6594,39 @@
           <a:lstStyle/>
           <a:p>
             <a:r>
-              <a:rPr lang="en-US" b="1" dirty="0" smtClean="0"/>
+              <a:rPr lang="en-US" b="1" dirty="0"/>
               <a:t>YARN is the system that runs your code on multiple nodes</a:t>
             </a:r>
           </a:p>
           <a:p>
             <a:r>
-              <a:rPr lang="en-US" dirty="0" err="1" smtClean="0"/>
+              <a:rPr lang="en-US" dirty="0" err="1"/>
               <a:t>Hadoop</a:t>
             </a:r>
             <a:r>
-              <a:rPr lang="en-US" dirty="0" smtClean="0"/>
+              <a:rPr lang="en-US" dirty="0"/>
               <a:t> 2.0 replacement for the cluster manager</a:t>
             </a:r>
           </a:p>
           <a:p>
             <a:pPr lvl="1"/>
             <a:r>
-              <a:rPr lang="en-US" dirty="0" smtClean="0"/>
+              <a:rPr lang="en-US" dirty="0"/>
               <a:t>Basically a model to distribute and manage workloads</a:t>
             </a:r>
           </a:p>
           <a:p>
             <a:pPr lvl="1"/>
             <a:r>
-              <a:rPr lang="en-US" dirty="0" smtClean="0"/>
+              <a:rPr lang="en-US" dirty="0"/>
               <a:t>Not just </a:t>
             </a:r>
             <a:r>
-              <a:rPr lang="en-US" dirty="0" err="1" smtClean="0"/>
+              <a:rPr lang="en-US" dirty="0" err="1"/>
               <a:t>MapReduce</a:t>
             </a:r>
             <a:r>
-              <a:rPr lang="en-US" dirty="0" smtClean="0"/>
+              <a:rPr lang="en-US" dirty="0"/>
               <a:t> but supports other workloads</a:t>
             </a:r>
           </a:p>
@@ -6821,10 +6684,9 @@
           <a:lstStyle/>
           <a:p>
             <a:r>
-              <a:rPr lang="en-US" dirty="0" smtClean="0"/>
+              <a:rPr lang="en-US" dirty="0"/>
               <a:t>YARN architecture</a:t>
             </a:r>
-            <a:endParaRPr lang="en-US" dirty="0"/>
           </a:p>
         </p:txBody>
       </p:sp>
@@ -6900,19 +6762,15 @@
           <a:lstStyle/>
           <a:p>
             <a:r>
-              <a:rPr lang="en-US" dirty="0" smtClean="0"/>
+              <a:rPr lang="en-US" dirty="0"/>
               <a:t>Apache </a:t>
             </a:r>
             <a:r>
-              <a:rPr lang="en-US" dirty="0" err="1" smtClean="0"/>
+              <a:rPr lang="en-US" dirty="0" err="1"/>
               <a:t>Mesos</a:t>
             </a:r>
-            <a:r>
-              <a:rPr lang="en-US" dirty="0" smtClean="0"/>
-              <a:t/>
-            </a:r>
             <a:br>
-              <a:rPr lang="en-US" dirty="0" smtClean="0"/>
+              <a:rPr lang="en-US" dirty="0"/>
             </a:br>
             <a:endParaRPr lang="en-US" dirty="0"/>
           </a:p>
@@ -6952,13 +6810,6 @@
   <p:clrMapOvr>
     <a:masterClrMapping/>
   </p:clrMapOvr>
-  <p:timing>
-    <p:tnLst>
-      <p:par>
-        <p:cTn xmlns:p14="http://schemas.microsoft.com/office/powerpoint/2010/main" id="1" dur="indefinite" restart="never" nodeType="tmRoot"/>
-      </p:par>
-    </p:tnLst>
-  </p:timing>
 </p:sld>
 </file>
 
@@ -6995,10 +6846,9 @@
           <a:lstStyle/>
           <a:p>
             <a:r>
-              <a:rPr lang="en-US" dirty="0" smtClean="0"/>
+              <a:rPr lang="en-US" dirty="0"/>
               <a:t>Infrastructure-as-a-Service</a:t>
             </a:r>
-            <a:endParaRPr lang="en-US" dirty="0"/>
           </a:p>
         </p:txBody>
       </p:sp>
@@ -7072,10 +6922,9 @@
           <a:lstStyle/>
           <a:p>
             <a:r>
-              <a:rPr lang="en-US" dirty="0" smtClean="0"/>
+              <a:rPr lang="en-US" dirty="0"/>
               <a:t>EC2 / AWS main functions</a:t>
             </a:r>
-            <a:endParaRPr lang="en-US" dirty="0"/>
           </a:p>
         </p:txBody>
       </p:sp>
@@ -7097,89 +6946,89 @@
           <a:lstStyle/>
           <a:p>
             <a:r>
-              <a:rPr lang="en-US" dirty="0" smtClean="0"/>
+              <a:rPr lang="en-US" dirty="0"/>
               <a:t>EC2 (Elastic Compute Cloud)</a:t>
             </a:r>
           </a:p>
           <a:p>
             <a:pPr lvl="1"/>
             <a:r>
-              <a:rPr lang="en-US" dirty="0" smtClean="0"/>
+              <a:rPr lang="en-US" dirty="0"/>
               <a:t>Instances</a:t>
             </a:r>
           </a:p>
           <a:p>
             <a:pPr lvl="2"/>
             <a:r>
-              <a:rPr lang="en-US" dirty="0" smtClean="0"/>
+              <a:rPr lang="en-US" dirty="0"/>
               <a:t>Servers of various sizes</a:t>
             </a:r>
           </a:p>
           <a:p>
             <a:pPr lvl="1"/>
             <a:r>
-              <a:rPr lang="en-US" dirty="0" smtClean="0"/>
+              <a:rPr lang="en-US" dirty="0"/>
               <a:t>AMIs (Amazon Machine Images)</a:t>
             </a:r>
           </a:p>
           <a:p>
             <a:pPr lvl="2"/>
             <a:r>
-              <a:rPr lang="en-US" dirty="0" smtClean="0"/>
+              <a:rPr lang="en-US" dirty="0"/>
               <a:t>Server images </a:t>
             </a:r>
           </a:p>
           <a:p>
             <a:pPr lvl="1"/>
             <a:r>
-              <a:rPr lang="en-US" dirty="0" smtClean="0"/>
+              <a:rPr lang="en-US" dirty="0"/>
               <a:t>Elastic Block Storage (EBS)</a:t>
             </a:r>
           </a:p>
           <a:p>
             <a:pPr lvl="2"/>
             <a:r>
-              <a:rPr lang="en-US" dirty="0" smtClean="0"/>
+              <a:rPr lang="en-US" dirty="0"/>
               <a:t>Virtualized Hard drives</a:t>
             </a:r>
           </a:p>
           <a:p>
             <a:pPr lvl="1"/>
             <a:r>
-              <a:rPr lang="en-US" dirty="0" smtClean="0"/>
+              <a:rPr lang="en-US" dirty="0"/>
               <a:t>VPC (Virtual Private Cloud)</a:t>
             </a:r>
           </a:p>
           <a:p>
             <a:pPr lvl="2"/>
             <a:r>
-              <a:rPr lang="en-US" dirty="0" smtClean="0"/>
+              <a:rPr lang="en-US" dirty="0"/>
               <a:t>Secure network space</a:t>
             </a:r>
           </a:p>
           <a:p>
             <a:r>
-              <a:rPr lang="en-US" dirty="0" smtClean="0"/>
+              <a:rPr lang="en-US" dirty="0"/>
               <a:t>S3 (Simple Storage Solution)</a:t>
             </a:r>
           </a:p>
           <a:p>
             <a:pPr lvl="1"/>
             <a:r>
-              <a:rPr lang="en-US" dirty="0" smtClean="0"/>
+              <a:rPr lang="en-US" dirty="0"/>
               <a:t>“Buckets” of data </a:t>
             </a:r>
           </a:p>
           <a:p>
             <a:pPr lvl="1"/>
             <a:r>
-              <a:rPr lang="en-US" dirty="0" smtClean="0"/>
+              <a:rPr lang="en-US" dirty="0"/>
               <a:t>Longer term storage of data</a:t>
             </a:r>
           </a:p>
           <a:p>
             <a:pPr lvl="1"/>
-            <a:endParaRPr lang="en-US" dirty="0" smtClean="0"/>
+            <a:endParaRPr lang="en-US" dirty="0"/>
           </a:p>
         </p:txBody>
       </p:sp>
@@ -7229,7 +7078,7 @@
           <a:lstStyle/>
           <a:p>
             <a:r>
-              <a:rPr lang="en-US" dirty="0" err="1" smtClean="0"/>
+              <a:rPr lang="en-US" dirty="0" err="1"/>
               <a:t>Flintrock</a:t>
             </a:r>
             <a:endParaRPr lang="en-US" dirty="0"/>
@@ -7292,7 +7141,13 @@
       </p:grpSpPr>
       <p:sp>
         <p:nvSpPr>
-          <p:cNvPr id="2" name="Title 1"/>
+          <p:cNvPr id="2" name="Title 1">
+            <a:extLst>
+              <a:ext uri="{FF2B5EF4-FFF2-40B4-BE49-F238E27FC236}">
+                <a16:creationId xmlns:a16="http://schemas.microsoft.com/office/drawing/2014/main" id="{EDBAF2B1-4029-414C-956E-98EC56153626}"/>
+              </a:ext>
+            </a:extLst>
+          </p:cNvPr>
           <p:cNvSpPr>
             <a:spLocks noGrp="1"/>
           </p:cNvSpPr>
@@ -7306,24 +7161,27 @@
           <a:lstStyle/>
           <a:p>
             <a:r>
-              <a:rPr lang="en-US" dirty="0" err="1" smtClean="0"/>
-              <a:t>Flintrock</a:t>
-            </a:r>
-            <a:r>
-              <a:rPr lang="en-US" dirty="0" smtClean="0"/>
-              <a:t> Launching a cluster</a:t>
-            </a:r>
-            <a:endParaRPr lang="en-US" dirty="0"/>
+              <a:rPr lang="en-US" dirty="0"/>
+              <a:t>Installing standalone version</a:t>
+            </a:r>
           </a:p>
         </p:txBody>
       </p:sp>
       <p:pic>
         <p:nvPicPr>
-          <p:cNvPr id="4" name="Picture 3"/>
+          <p:cNvPr id="5" name="Content Placeholder 4">
+            <a:extLst>
+              <a:ext uri="{FF2B5EF4-FFF2-40B4-BE49-F238E27FC236}">
+                <a16:creationId xmlns:a16="http://schemas.microsoft.com/office/drawing/2014/main" id="{4C42ADEA-D8AF-D049-8389-7EC273BF5254}"/>
+              </a:ext>
+            </a:extLst>
+          </p:cNvPr>
           <p:cNvPicPr>
-            <a:picLocks noChangeAspect="1"/>
+            <a:picLocks noGrp="1" noChangeAspect="1"/>
           </p:cNvPicPr>
-          <p:nvPr/>
+          <p:nvPr>
+            <p:ph idx="1"/>
+          </p:nvPr>
         </p:nvPicPr>
         <p:blipFill>
           <a:blip r:embed="rId2"/>
@@ -7333,18 +7191,15 @@
         </p:blipFill>
         <p:spPr>
           <a:xfrm>
-            <a:off x="168922" y="1417638"/>
-            <a:ext cx="8517878" cy="3887520"/>
-          </a:xfrm>
-          <a:prstGeom prst="rect">
-            <a:avLst/>
-          </a:prstGeom>
+            <a:off x="235435" y="1676400"/>
+            <a:ext cx="8315898" cy="4273201"/>
+          </a:xfrm>
         </p:spPr>
       </p:pic>
     </p:spTree>
     <p:extLst>
       <p:ext uri="{BB962C8B-B14F-4D97-AF65-F5344CB8AC3E}">
-        <p14:creationId xmlns:p14="http://schemas.microsoft.com/office/powerpoint/2010/main" val="2244670542"/>
+        <p14:creationId xmlns:p14="http://schemas.microsoft.com/office/powerpoint/2010/main" val="2754606213"/>
       </p:ext>
     </p:extLst>
   </p:cSld>
@@ -7373,7 +7228,13 @@
       </p:grpSpPr>
       <p:sp>
         <p:nvSpPr>
-          <p:cNvPr id="2" name="Title 1"/>
+          <p:cNvPr id="2" name="Title 1">
+            <a:extLst>
+              <a:ext uri="{FF2B5EF4-FFF2-40B4-BE49-F238E27FC236}">
+                <a16:creationId xmlns:a16="http://schemas.microsoft.com/office/drawing/2014/main" id="{A1F297A5-F4BC-3E41-8828-795204FA0903}"/>
+              </a:ext>
+            </a:extLst>
+          </p:cNvPr>
           <p:cNvSpPr>
             <a:spLocks noGrp="1"/>
           </p:cNvSpPr>
@@ -7386,315 +7247,67 @@
           <a:bodyPr/>
           <a:lstStyle/>
           <a:p>
-            <a:r>
-              <a:rPr lang="en-US" dirty="0" smtClean="0"/>
-              <a:t>Other things you can do</a:t>
-            </a:r>
+            <a:endParaRPr lang="en-US"/>
+          </a:p>
+        </p:txBody>
+      </p:sp>
+      <p:sp>
+        <p:nvSpPr>
+          <p:cNvPr id="3" name="Content Placeholder 2">
+            <a:extLst>
+              <a:ext uri="{FF2B5EF4-FFF2-40B4-BE49-F238E27FC236}">
+                <a16:creationId xmlns:a16="http://schemas.microsoft.com/office/drawing/2014/main" id="{CEA33682-547C-4A41-B231-F37CE5664126}"/>
+              </a:ext>
+            </a:extLst>
+          </p:cNvPr>
+          <p:cNvSpPr>
+            <a:spLocks noGrp="1"/>
+          </p:cNvSpPr>
+          <p:nvPr>
+            <p:ph idx="1"/>
+          </p:nvPr>
+        </p:nvSpPr>
+        <p:spPr/>
+        <p:txBody>
+          <a:bodyPr>
+            <a:normAutofit lnSpcReduction="10000"/>
+          </a:bodyPr>
+          <a:lstStyle/>
+          <a:p>
+            <a:r>
+              <a:rPr lang="en-GB" dirty="0"/>
+              <a:t>curl --location --remote-name </a:t>
+            </a:r>
+            <a:r>
+              <a:rPr lang="en-GB" dirty="0">
+                <a:hlinkClick r:id="rId2"/>
+              </a:rPr>
+              <a:t>https://github.com/nchammas/flintrock/releases/download/v$flintrock_version/Flintrock-$flintrock_version-standalone-OSX-x86_64.zip</a:t>
+            </a:r>
+            <a:endParaRPr lang="en-GB" dirty="0"/>
+          </a:p>
+          <a:p>
+            <a:r>
+              <a:rPr lang="en-GB" dirty="0"/>
+              <a:t>curl --location --remote-name </a:t>
+            </a:r>
+            <a:r>
+              <a:rPr lang="en-GB" dirty="0">
+                <a:hlinkClick r:id="rId2"/>
+              </a:rPr>
+              <a:t>https://github.com/nchammas/flintrock/releases/download/v$flintrock_version/Flintrock-$flintrock_version-standalone-Linux-x86_64.zip</a:t>
+            </a:r>
+            <a:endParaRPr lang="en-GB" dirty="0"/>
+          </a:p>
+          <a:p>
             <a:endParaRPr lang="en-US" dirty="0"/>
-          </a:p>
-        </p:txBody>
-      </p:sp>
-      <p:sp>
-        <p:nvSpPr>
-          <p:cNvPr id="3" name="Content Placeholder 2"/>
-          <p:cNvSpPr>
-            <a:spLocks noGrp="1"/>
-          </p:cNvSpPr>
-          <p:nvPr>
-            <p:ph idx="1"/>
-          </p:nvPr>
-        </p:nvSpPr>
-        <p:spPr/>
-        <p:txBody>
-          <a:bodyPr>
-            <a:normAutofit fontScale="85000" lnSpcReduction="20000"/>
-          </a:bodyPr>
-          <a:lstStyle/>
-          <a:p>
-            <a:pPr marL="0" indent="0">
-              <a:buNone/>
-            </a:pPr>
-            <a:r>
-              <a:rPr lang="en-US" dirty="0" err="1">
-                <a:latin typeface="Menlo Regular"/>
-                <a:cs typeface="Menlo Regular"/>
-              </a:rPr>
-              <a:t>flintrock</a:t>
-            </a:r>
-            <a:r>
-              <a:rPr lang="en-US" dirty="0">
-                <a:latin typeface="Menlo Regular"/>
-                <a:cs typeface="Menlo Regular"/>
-              </a:rPr>
-              <a:t> destroy test-cluster</a:t>
-            </a:r>
-          </a:p>
-          <a:p>
-            <a:pPr marL="0" indent="0">
-              <a:buNone/>
-            </a:pPr>
-            <a:r>
-              <a:rPr lang="en-US" dirty="0" err="1" smtClean="0">
-                <a:latin typeface="Menlo Regular"/>
-                <a:cs typeface="Menlo Regular"/>
-              </a:rPr>
-              <a:t>flintrock</a:t>
-            </a:r>
-            <a:r>
-              <a:rPr lang="en-US" dirty="0" smtClean="0">
-                <a:latin typeface="Menlo Regular"/>
-                <a:cs typeface="Menlo Regular"/>
-              </a:rPr>
-              <a:t> </a:t>
-            </a:r>
-            <a:r>
-              <a:rPr lang="en-US" dirty="0">
-                <a:latin typeface="Menlo Regular"/>
-                <a:cs typeface="Menlo Regular"/>
-              </a:rPr>
-              <a:t>login test-cluster</a:t>
-            </a:r>
-          </a:p>
-          <a:p>
-            <a:pPr marL="0" indent="0">
-              <a:buNone/>
-            </a:pPr>
-            <a:r>
-              <a:rPr lang="en-US" dirty="0" err="1">
-                <a:latin typeface="Menlo Regular"/>
-                <a:cs typeface="Menlo Regular"/>
-              </a:rPr>
-              <a:t>flintrock</a:t>
-            </a:r>
-            <a:r>
-              <a:rPr lang="en-US" dirty="0">
-                <a:latin typeface="Menlo Regular"/>
-                <a:cs typeface="Menlo Regular"/>
-              </a:rPr>
-              <a:t> describe test-cluster</a:t>
-            </a:r>
-          </a:p>
-          <a:p>
-            <a:pPr marL="0" indent="0">
-              <a:buNone/>
-            </a:pPr>
-            <a:r>
-              <a:rPr lang="en-US" dirty="0" err="1">
-                <a:latin typeface="Menlo Regular"/>
-                <a:cs typeface="Menlo Regular"/>
-              </a:rPr>
-              <a:t>flintrock</a:t>
-            </a:r>
-            <a:r>
-              <a:rPr lang="en-US" dirty="0">
-                <a:latin typeface="Menlo Regular"/>
-                <a:cs typeface="Menlo Regular"/>
-              </a:rPr>
-              <a:t> add-slaves test-cluster </a:t>
-            </a:r>
-            <a:endParaRPr lang="en-US" dirty="0" smtClean="0">
-              <a:latin typeface="Menlo Regular"/>
-              <a:cs typeface="Menlo Regular"/>
-            </a:endParaRPr>
-          </a:p>
-          <a:p>
-            <a:pPr marL="457200" lvl="1" indent="0">
-              <a:buNone/>
-            </a:pPr>
-            <a:r>
-              <a:rPr lang="en-US" dirty="0">
-                <a:latin typeface="Menlo Regular"/>
-                <a:cs typeface="Menlo Regular"/>
-              </a:rPr>
-              <a:t>	</a:t>
-            </a:r>
-            <a:r>
-              <a:rPr lang="en-US" dirty="0" smtClean="0">
-                <a:latin typeface="Menlo Regular"/>
-                <a:cs typeface="Menlo Regular"/>
-              </a:rPr>
-              <a:t>-</a:t>
-            </a:r>
-            <a:r>
-              <a:rPr lang="en-US" dirty="0">
-                <a:latin typeface="Menlo Regular"/>
-                <a:cs typeface="Menlo Regular"/>
-              </a:rPr>
-              <a:t>-</a:t>
-            </a:r>
-            <a:r>
-              <a:rPr lang="en-US" dirty="0" err="1">
-                <a:latin typeface="Menlo Regular"/>
-                <a:cs typeface="Menlo Regular"/>
-              </a:rPr>
-              <a:t>num</a:t>
-            </a:r>
-            <a:r>
-              <a:rPr lang="en-US" dirty="0">
-                <a:latin typeface="Menlo Regular"/>
-                <a:cs typeface="Menlo Regular"/>
-              </a:rPr>
-              <a:t>-slaves 2</a:t>
-            </a:r>
-          </a:p>
-          <a:p>
-            <a:pPr marL="0" indent="0">
-              <a:buNone/>
-            </a:pPr>
-            <a:r>
-              <a:rPr lang="en-US" dirty="0" err="1">
-                <a:latin typeface="Menlo Regular"/>
-                <a:cs typeface="Menlo Regular"/>
-              </a:rPr>
-              <a:t>flintrock</a:t>
-            </a:r>
-            <a:r>
-              <a:rPr lang="en-US" dirty="0">
-                <a:latin typeface="Menlo Regular"/>
-                <a:cs typeface="Menlo Regular"/>
-              </a:rPr>
-              <a:t> remove-slaves test-cluster </a:t>
-            </a:r>
-            <a:endParaRPr lang="en-US" dirty="0" smtClean="0">
-              <a:latin typeface="Menlo Regular"/>
-              <a:cs typeface="Menlo Regular"/>
-            </a:endParaRPr>
-          </a:p>
-          <a:p>
-            <a:pPr marL="0" indent="0">
-              <a:buNone/>
-            </a:pPr>
-            <a:r>
-              <a:rPr lang="en-US" dirty="0">
-                <a:latin typeface="Menlo Regular"/>
-                <a:cs typeface="Menlo Regular"/>
-              </a:rPr>
-              <a:t>	</a:t>
-            </a:r>
-            <a:r>
-              <a:rPr lang="en-US" dirty="0" smtClean="0">
-                <a:latin typeface="Menlo Regular"/>
-                <a:cs typeface="Menlo Regular"/>
-              </a:rPr>
-              <a:t>	-</a:t>
-            </a:r>
-            <a:r>
-              <a:rPr lang="en-US" dirty="0">
-                <a:latin typeface="Menlo Regular"/>
-                <a:cs typeface="Menlo Regular"/>
-              </a:rPr>
-              <a:t>-</a:t>
-            </a:r>
-            <a:r>
-              <a:rPr lang="en-US" dirty="0" err="1">
-                <a:latin typeface="Menlo Regular"/>
-                <a:cs typeface="Menlo Regular"/>
-              </a:rPr>
-              <a:t>num</a:t>
-            </a:r>
-            <a:r>
-              <a:rPr lang="en-US" dirty="0">
-                <a:latin typeface="Menlo Regular"/>
-                <a:cs typeface="Menlo Regular"/>
-              </a:rPr>
-              <a:t>-slaves 1</a:t>
-            </a:r>
-          </a:p>
-          <a:p>
-            <a:pPr marL="0" indent="0">
-              <a:buNone/>
-            </a:pPr>
-            <a:r>
-              <a:rPr lang="en-US" dirty="0" err="1">
-                <a:latin typeface="Menlo Regular"/>
-                <a:cs typeface="Menlo Regular"/>
-              </a:rPr>
-              <a:t>flintrock</a:t>
-            </a:r>
-            <a:r>
-              <a:rPr lang="en-US" dirty="0">
-                <a:latin typeface="Menlo Regular"/>
-                <a:cs typeface="Menlo Regular"/>
-              </a:rPr>
-              <a:t> run-command test-cluster </a:t>
-            </a:r>
-            <a:r>
-              <a:rPr lang="en-US" dirty="0" smtClean="0">
-                <a:latin typeface="Menlo Regular"/>
-                <a:cs typeface="Menlo Regular"/>
-              </a:rPr>
-              <a:t>	'</a:t>
-            </a:r>
-            <a:r>
-              <a:rPr lang="en-US" dirty="0" err="1">
-                <a:latin typeface="Menlo Regular"/>
-                <a:cs typeface="Menlo Regular"/>
-              </a:rPr>
-              <a:t>sudo</a:t>
-            </a:r>
-            <a:r>
-              <a:rPr lang="en-US" dirty="0">
-                <a:latin typeface="Menlo Regular"/>
-                <a:cs typeface="Menlo Regular"/>
-              </a:rPr>
-              <a:t> yum install -y package'</a:t>
-            </a:r>
-          </a:p>
-          <a:p>
-            <a:pPr marL="0" indent="0">
-              <a:buNone/>
-            </a:pPr>
-            <a:r>
-              <a:rPr lang="en-US" dirty="0" err="1">
-                <a:latin typeface="Menlo Regular"/>
-                <a:cs typeface="Menlo Regular"/>
-              </a:rPr>
-              <a:t>flintrock</a:t>
-            </a:r>
-            <a:r>
-              <a:rPr lang="en-US" dirty="0">
-                <a:latin typeface="Menlo Regular"/>
-                <a:cs typeface="Menlo Regular"/>
-              </a:rPr>
-              <a:t> copy-file test-cluster </a:t>
-            </a:r>
-            <a:endParaRPr lang="en-US" dirty="0" smtClean="0">
-              <a:latin typeface="Menlo Regular"/>
-              <a:cs typeface="Menlo Regular"/>
-            </a:endParaRPr>
-          </a:p>
-          <a:p>
-            <a:pPr marL="0" indent="0">
-              <a:buNone/>
-            </a:pPr>
-            <a:r>
-              <a:rPr lang="en-US" dirty="0">
-                <a:latin typeface="Menlo Regular"/>
-                <a:cs typeface="Menlo Regular"/>
-              </a:rPr>
-              <a:t>	</a:t>
-            </a:r>
-            <a:r>
-              <a:rPr lang="en-US" dirty="0" smtClean="0">
-                <a:latin typeface="Menlo Regular"/>
-                <a:cs typeface="Menlo Regular"/>
-              </a:rPr>
-              <a:t>	/</a:t>
-            </a:r>
-            <a:r>
-              <a:rPr lang="en-US" dirty="0">
-                <a:latin typeface="Menlo Regular"/>
-                <a:cs typeface="Menlo Regular"/>
-              </a:rPr>
-              <a:t>local/path /remote/path</a:t>
-            </a:r>
           </a:p>
         </p:txBody>
       </p:sp>
     </p:spTree>
     <p:extLst>
       <p:ext uri="{BB962C8B-B14F-4D97-AF65-F5344CB8AC3E}">
-        <p14:creationId xmlns:p14="http://schemas.microsoft.com/office/powerpoint/2010/main" val="769307551"/>
+        <p14:creationId xmlns:p14="http://schemas.microsoft.com/office/powerpoint/2010/main" val="1390415544"/>
       </p:ext>
     </p:extLst>
   </p:cSld>
@@ -7737,10 +7350,9 @@
           <a:lstStyle/>
           <a:p>
             <a:r>
-              <a:rPr lang="en-US" dirty="0" smtClean="0"/>
+              <a:rPr lang="en-US" dirty="0"/>
               <a:t>HDFS inspiration	</a:t>
             </a:r>
-            <a:endParaRPr lang="en-US" dirty="0"/>
           </a:p>
         </p:txBody>
       </p:sp>
@@ -7760,7 +7372,7 @@
           <a:lstStyle/>
           <a:p>
             <a:r>
-              <a:rPr lang="en-US" dirty="0" smtClean="0"/>
+              <a:rPr lang="en-US" dirty="0"/>
               <a:t>Google File System</a:t>
             </a:r>
           </a:p>
@@ -7867,10 +7479,370 @@
           <a:lstStyle/>
           <a:p>
             <a:r>
-              <a:rPr lang="en-US" dirty="0" smtClean="0"/>
+              <a:rPr lang="en-US" dirty="0" err="1"/>
+              <a:t>Flintrock</a:t>
+            </a:r>
+            <a:r>
+              <a:rPr lang="en-US" dirty="0"/>
+              <a:t> Launching a cluster</a:t>
+            </a:r>
+          </a:p>
+        </p:txBody>
+      </p:sp>
+      <p:pic>
+        <p:nvPicPr>
+          <p:cNvPr id="4" name="Picture 3"/>
+          <p:cNvPicPr>
+            <a:picLocks noChangeAspect="1"/>
+          </p:cNvPicPr>
+          <p:nvPr/>
+        </p:nvPicPr>
+        <p:blipFill>
+          <a:blip r:embed="rId2"/>
+          <a:stretch>
+            <a:fillRect/>
+          </a:stretch>
+        </p:blipFill>
+        <p:spPr>
+          <a:xfrm>
+            <a:off x="168922" y="1417638"/>
+            <a:ext cx="8517878" cy="3887520"/>
+          </a:xfrm>
+          <a:prstGeom prst="rect">
+            <a:avLst/>
+          </a:prstGeom>
+        </p:spPr>
+      </p:pic>
+    </p:spTree>
+    <p:extLst>
+      <p:ext uri="{BB962C8B-B14F-4D97-AF65-F5344CB8AC3E}">
+        <p14:creationId xmlns:p14="http://schemas.microsoft.com/office/powerpoint/2010/main" val="2244670542"/>
+      </p:ext>
+    </p:extLst>
+  </p:cSld>
+  <p:clrMapOvr>
+    <a:masterClrMapping/>
+  </p:clrMapOvr>
+</p:sld>
+</file>
+
+<file path=ppt/slides/slide31.xml><?xml version="1.0" encoding="utf-8"?>
+<p:sld xmlns:a="http://schemas.openxmlformats.org/drawingml/2006/main" xmlns:r="http://schemas.openxmlformats.org/officeDocument/2006/relationships" xmlns:p="http://schemas.openxmlformats.org/presentationml/2006/main">
+  <p:cSld>
+    <p:spTree>
+      <p:nvGrpSpPr>
+        <p:cNvPr id="1" name=""/>
+        <p:cNvGrpSpPr/>
+        <p:nvPr/>
+      </p:nvGrpSpPr>
+      <p:grpSpPr>
+        <a:xfrm>
+          <a:off x="0" y="0"/>
+          <a:ext cx="0" cy="0"/>
+          <a:chOff x="0" y="0"/>
+          <a:chExt cx="0" cy="0"/>
+        </a:xfrm>
+      </p:grpSpPr>
+      <p:sp>
+        <p:nvSpPr>
+          <p:cNvPr id="2" name="Title 1"/>
+          <p:cNvSpPr>
+            <a:spLocks noGrp="1"/>
+          </p:cNvSpPr>
+          <p:nvPr>
+            <p:ph type="title"/>
+          </p:nvPr>
+        </p:nvSpPr>
+        <p:spPr/>
+        <p:txBody>
+          <a:bodyPr/>
+          <a:lstStyle/>
+          <a:p>
+            <a:r>
+              <a:rPr lang="en-US" dirty="0"/>
+              <a:t>Other things you can do</a:t>
+            </a:r>
+          </a:p>
+        </p:txBody>
+      </p:sp>
+      <p:sp>
+        <p:nvSpPr>
+          <p:cNvPr id="3" name="Content Placeholder 2"/>
+          <p:cNvSpPr>
+            <a:spLocks noGrp="1"/>
+          </p:cNvSpPr>
+          <p:nvPr>
+            <p:ph idx="1"/>
+          </p:nvPr>
+        </p:nvSpPr>
+        <p:spPr/>
+        <p:txBody>
+          <a:bodyPr>
+            <a:normAutofit fontScale="85000" lnSpcReduction="20000"/>
+          </a:bodyPr>
+          <a:lstStyle/>
+          <a:p>
+            <a:pPr marL="0" indent="0">
+              <a:buNone/>
+            </a:pPr>
+            <a:r>
+              <a:rPr lang="en-US" dirty="0" err="1">
+                <a:latin typeface="Menlo Regular"/>
+                <a:cs typeface="Menlo Regular"/>
+              </a:rPr>
+              <a:t>flintrock</a:t>
+            </a:r>
+            <a:r>
+              <a:rPr lang="en-US" dirty="0">
+                <a:latin typeface="Menlo Regular"/>
+                <a:cs typeface="Menlo Regular"/>
+              </a:rPr>
+              <a:t> destroy test-cluster</a:t>
+            </a:r>
+          </a:p>
+          <a:p>
+            <a:pPr marL="0" indent="0">
+              <a:buNone/>
+            </a:pPr>
+            <a:r>
+              <a:rPr lang="en-US" dirty="0" err="1">
+                <a:latin typeface="Menlo Regular"/>
+                <a:cs typeface="Menlo Regular"/>
+              </a:rPr>
+              <a:t>flintrock</a:t>
+            </a:r>
+            <a:r>
+              <a:rPr lang="en-US" dirty="0">
+                <a:latin typeface="Menlo Regular"/>
+                <a:cs typeface="Menlo Regular"/>
+              </a:rPr>
+              <a:t> login test-cluster</a:t>
+            </a:r>
+          </a:p>
+          <a:p>
+            <a:pPr marL="0" indent="0">
+              <a:buNone/>
+            </a:pPr>
+            <a:r>
+              <a:rPr lang="en-US" dirty="0" err="1">
+                <a:latin typeface="Menlo Regular"/>
+                <a:cs typeface="Menlo Regular"/>
+              </a:rPr>
+              <a:t>flintrock</a:t>
+            </a:r>
+            <a:r>
+              <a:rPr lang="en-US" dirty="0">
+                <a:latin typeface="Menlo Regular"/>
+                <a:cs typeface="Menlo Regular"/>
+              </a:rPr>
+              <a:t> describe test-cluster</a:t>
+            </a:r>
+          </a:p>
+          <a:p>
+            <a:pPr marL="0" indent="0">
+              <a:buNone/>
+            </a:pPr>
+            <a:r>
+              <a:rPr lang="en-US" dirty="0" err="1">
+                <a:latin typeface="Menlo Regular"/>
+                <a:cs typeface="Menlo Regular"/>
+              </a:rPr>
+              <a:t>flintrock</a:t>
+            </a:r>
+            <a:r>
+              <a:rPr lang="en-US" dirty="0">
+                <a:latin typeface="Menlo Regular"/>
+                <a:cs typeface="Menlo Regular"/>
+              </a:rPr>
+              <a:t> add-slaves test-cluster </a:t>
+            </a:r>
+          </a:p>
+          <a:p>
+            <a:pPr marL="457200" lvl="1" indent="0">
+              <a:buNone/>
+            </a:pPr>
+            <a:r>
+              <a:rPr lang="en-US" dirty="0">
+                <a:latin typeface="Menlo Regular"/>
+                <a:cs typeface="Menlo Regular"/>
+              </a:rPr>
+              <a:t>	--</a:t>
+            </a:r>
+            <a:r>
+              <a:rPr lang="en-US" dirty="0" err="1">
+                <a:latin typeface="Menlo Regular"/>
+                <a:cs typeface="Menlo Regular"/>
+              </a:rPr>
+              <a:t>num</a:t>
+            </a:r>
+            <a:r>
+              <a:rPr lang="en-US" dirty="0">
+                <a:latin typeface="Menlo Regular"/>
+                <a:cs typeface="Menlo Regular"/>
+              </a:rPr>
+              <a:t>-slaves 2</a:t>
+            </a:r>
+          </a:p>
+          <a:p>
+            <a:pPr marL="0" indent="0">
+              <a:buNone/>
+            </a:pPr>
+            <a:r>
+              <a:rPr lang="en-US" dirty="0" err="1">
+                <a:latin typeface="Menlo Regular"/>
+                <a:cs typeface="Menlo Regular"/>
+              </a:rPr>
+              <a:t>flintrock</a:t>
+            </a:r>
+            <a:r>
+              <a:rPr lang="en-US" dirty="0">
+                <a:latin typeface="Menlo Regular"/>
+                <a:cs typeface="Menlo Regular"/>
+              </a:rPr>
+              <a:t> remove-slaves test-cluster </a:t>
+            </a:r>
+          </a:p>
+          <a:p>
+            <a:pPr marL="0" indent="0">
+              <a:buNone/>
+            </a:pPr>
+            <a:r>
+              <a:rPr lang="en-US" dirty="0">
+                <a:latin typeface="Menlo Regular"/>
+                <a:cs typeface="Menlo Regular"/>
+              </a:rPr>
+              <a:t>		--</a:t>
+            </a:r>
+            <a:r>
+              <a:rPr lang="en-US" dirty="0" err="1">
+                <a:latin typeface="Menlo Regular"/>
+                <a:cs typeface="Menlo Regular"/>
+              </a:rPr>
+              <a:t>num</a:t>
+            </a:r>
+            <a:r>
+              <a:rPr lang="en-US" dirty="0">
+                <a:latin typeface="Menlo Regular"/>
+                <a:cs typeface="Menlo Regular"/>
+              </a:rPr>
+              <a:t>-slaves 1</a:t>
+            </a:r>
+          </a:p>
+          <a:p>
+            <a:pPr marL="0" indent="0">
+              <a:buNone/>
+            </a:pPr>
+            <a:r>
+              <a:rPr lang="en-US" dirty="0" err="1">
+                <a:latin typeface="Menlo Regular"/>
+                <a:cs typeface="Menlo Regular"/>
+              </a:rPr>
+              <a:t>flintrock</a:t>
+            </a:r>
+            <a:r>
+              <a:rPr lang="en-US" dirty="0">
+                <a:latin typeface="Menlo Regular"/>
+                <a:cs typeface="Menlo Regular"/>
+              </a:rPr>
+              <a:t> run-command test-cluster 	'</a:t>
+            </a:r>
+            <a:r>
+              <a:rPr lang="en-US" dirty="0" err="1">
+                <a:latin typeface="Menlo Regular"/>
+                <a:cs typeface="Menlo Regular"/>
+              </a:rPr>
+              <a:t>sudo</a:t>
+            </a:r>
+            <a:r>
+              <a:rPr lang="en-US" dirty="0">
+                <a:latin typeface="Menlo Regular"/>
+                <a:cs typeface="Menlo Regular"/>
+              </a:rPr>
+              <a:t> yum install -y package'</a:t>
+            </a:r>
+          </a:p>
+          <a:p>
+            <a:pPr marL="0" indent="0">
+              <a:buNone/>
+            </a:pPr>
+            <a:r>
+              <a:rPr lang="en-US" dirty="0" err="1">
+                <a:latin typeface="Menlo Regular"/>
+                <a:cs typeface="Menlo Regular"/>
+              </a:rPr>
+              <a:t>flintrock</a:t>
+            </a:r>
+            <a:r>
+              <a:rPr lang="en-US" dirty="0">
+                <a:latin typeface="Menlo Regular"/>
+                <a:cs typeface="Menlo Regular"/>
+              </a:rPr>
+              <a:t> copy-file test-cluster </a:t>
+            </a:r>
+          </a:p>
+          <a:p>
+            <a:pPr marL="0" indent="0">
+              <a:buNone/>
+            </a:pPr>
+            <a:r>
+              <a:rPr lang="en-US" dirty="0">
+                <a:latin typeface="Menlo Regular"/>
+                <a:cs typeface="Menlo Regular"/>
+              </a:rPr>
+              <a:t>		/local/path /remote/path</a:t>
+            </a:r>
+          </a:p>
+        </p:txBody>
+      </p:sp>
+    </p:spTree>
+    <p:extLst>
+      <p:ext uri="{BB962C8B-B14F-4D97-AF65-F5344CB8AC3E}">
+        <p14:creationId xmlns:p14="http://schemas.microsoft.com/office/powerpoint/2010/main" val="769307551"/>
+      </p:ext>
+    </p:extLst>
+  </p:cSld>
+  <p:clrMapOvr>
+    <a:masterClrMapping/>
+  </p:clrMapOvr>
+</p:sld>
+</file>
+
+<file path=ppt/slides/slide32.xml><?xml version="1.0" encoding="utf-8"?>
+<p:sld xmlns:a="http://schemas.openxmlformats.org/drawingml/2006/main" xmlns:r="http://schemas.openxmlformats.org/officeDocument/2006/relationships" xmlns:p="http://schemas.openxmlformats.org/presentationml/2006/main">
+  <p:cSld>
+    <p:spTree>
+      <p:nvGrpSpPr>
+        <p:cNvPr id="1" name=""/>
+        <p:cNvGrpSpPr/>
+        <p:nvPr/>
+      </p:nvGrpSpPr>
+      <p:grpSpPr>
+        <a:xfrm>
+          <a:off x="0" y="0"/>
+          <a:ext cx="0" cy="0"/>
+          <a:chOff x="0" y="0"/>
+          <a:chExt cx="0" cy="0"/>
+        </a:xfrm>
+      </p:grpSpPr>
+      <p:sp>
+        <p:nvSpPr>
+          <p:cNvPr id="2" name="Title 1"/>
+          <p:cNvSpPr>
+            <a:spLocks noGrp="1"/>
+          </p:cNvSpPr>
+          <p:nvPr>
+            <p:ph type="title"/>
+          </p:nvPr>
+        </p:nvSpPr>
+        <p:spPr/>
+        <p:txBody>
+          <a:bodyPr/>
+          <a:lstStyle/>
+          <a:p>
+            <a:r>
+              <a:rPr lang="en-US" dirty="0"/>
               <a:t>Questions?</a:t>
             </a:r>
-            <a:endParaRPr lang="en-US" dirty="0"/>
           </a:p>
         </p:txBody>
       </p:sp>
@@ -7920,10 +7892,9 @@
           <a:lstStyle/>
           <a:p>
             <a:r>
-              <a:rPr lang="en-US" dirty="0" smtClean="0"/>
+              <a:rPr lang="en-US" dirty="0"/>
               <a:t>HDFS overview</a:t>
             </a:r>
-            <a:endParaRPr lang="en-US" dirty="0"/>
           </a:p>
         </p:txBody>
       </p:sp>
@@ -7940,33 +7911,32 @@
         <p:spPr/>
         <p:txBody>
           <a:bodyPr>
-            <a:normAutofit lnSpcReduction="10000"/>
+            <a:normAutofit/>
           </a:bodyPr>
           <a:lstStyle/>
           <a:p>
             <a:r>
-              <a:rPr lang="en-US" dirty="0" smtClean="0"/>
+              <a:rPr lang="en-US" dirty="0"/>
               <a:t>Good for streaming access to large files, reliability, scale</a:t>
             </a:r>
           </a:p>
           <a:p>
             <a:r>
-              <a:rPr lang="en-US" dirty="0" smtClean="0"/>
+              <a:rPr lang="en-US" dirty="0"/>
               <a:t>Not good for random access, small files</a:t>
             </a:r>
           </a:p>
           <a:p>
             <a:r>
-              <a:rPr lang="en-US" dirty="0" smtClean="0"/>
+              <a:rPr lang="en-US" dirty="0"/>
               <a:t>Blocks of data 64Mb in size (configurable)</a:t>
             </a:r>
           </a:p>
           <a:p>
             <a:r>
-              <a:rPr lang="en-US" dirty="0" smtClean="0"/>
+              <a:rPr lang="en-US" dirty="0"/>
               <a:t>Each block can be replicated across multiple data nodes for High Availability (HA)</a:t>
             </a:r>
-            <a:endParaRPr lang="en-US" dirty="0"/>
           </a:p>
         </p:txBody>
       </p:sp>
@@ -8016,10 +7986,9 @@
           <a:lstStyle/>
           <a:p>
             <a:r>
-              <a:rPr lang="en-US" dirty="0" smtClean="0"/>
+              <a:rPr lang="en-US" dirty="0"/>
               <a:t>HDFS Usage</a:t>
             </a:r>
-            <a:endParaRPr lang="en-US" dirty="0"/>
           </a:p>
         </p:txBody>
       </p:sp>
@@ -8041,11 +8010,11 @@
           <a:lstStyle/>
           <a:p>
             <a:r>
-              <a:rPr lang="en-US" dirty="0" err="1" smtClean="0"/>
+              <a:rPr lang="en-US" dirty="0" err="1"/>
               <a:t>Spotify</a:t>
             </a:r>
             <a:r>
-              <a:rPr lang="en-US" dirty="0" smtClean="0"/>
+              <a:rPr lang="en-US" dirty="0"/>
               <a:t> has 1600+ nodes, storing 60+ petabytes of data</a:t>
             </a:r>
           </a:p>
@@ -8061,53 +8030,21 @@
             </a:r>
             <a:r>
               <a:rPr lang="en-US" sz="1700" dirty="0"/>
-              <a:t>/system/files/conference/fast17/fast17-</a:t>
-            </a:r>
-            <a:r>
-              <a:rPr lang="en-US" sz="1700" dirty="0" smtClean="0"/>
-              <a:t>niazi.pdf</a:t>
-            </a:r>
-            <a:endParaRPr lang="en-US" dirty="0" smtClean="0"/>
-          </a:p>
-          <a:p>
-            <a:r>
-              <a:rPr lang="en-US" dirty="0" smtClean="0"/>
-              <a:t>One </a:t>
-            </a:r>
-            <a:r>
-              <a:rPr lang="en-US" dirty="0"/>
-              <a:t>of the Facebook's largest clusters </a:t>
-            </a:r>
-            <a:r>
-              <a:rPr lang="en-US" dirty="0" smtClean="0"/>
-              <a:t>(based on HDFS) holds more </a:t>
-            </a:r>
-            <a:r>
-              <a:rPr lang="en-US" dirty="0"/>
-              <a:t>than </a:t>
+              <a:t>/system/files/conference/fast17/fast17-niazi.pdf</a:t>
+            </a:r>
+            <a:endParaRPr lang="en-US" dirty="0"/>
+          </a:p>
+          <a:p>
+            <a:r>
+              <a:rPr lang="en-US" dirty="0"/>
+              <a:t>One of the Facebook's largest clusters (based on HDFS) holds more than </a:t>
             </a:r>
             <a:br>
               <a:rPr lang="en-US" dirty="0"/>
             </a:br>
             <a:r>
-              <a:rPr lang="en-US" dirty="0" smtClean="0"/>
-              <a:t>100 </a:t>
-            </a:r>
-            <a:r>
-              <a:rPr lang="en-US" dirty="0"/>
-              <a:t>PB of data, processing more than 60,000 </a:t>
-            </a:r>
-            <a:r>
-              <a:rPr lang="en-US" dirty="0" smtClean="0"/>
-              <a:t>Hive queries </a:t>
-            </a:r>
-            <a:r>
-              <a:rPr lang="en-US" dirty="0"/>
-              <a:t>a </a:t>
-            </a:r>
-            <a:r>
-              <a:rPr lang="en-US" dirty="0" smtClean="0"/>
-              <a:t>day</a:t>
+              <a:rPr lang="en-US" dirty="0"/>
+              <a:t>100 PB of data, processing more than 60,000 Hive queries a day</a:t>
             </a:r>
           </a:p>
           <a:p>
@@ -8130,16 +8067,12 @@
             </a:r>
             <a:r>
               <a:rPr lang="en-US" sz="1700" dirty="0"/>
-              <a:t>-engineering/under-the-hood-scheduling-mapreduce-jobs-more-efficiently-with-corona</a:t>
-            </a:r>
-            <a:r>
-              <a:rPr lang="en-US" sz="1700" dirty="0" smtClean="0"/>
-              <a:t>/</a:t>
+              <a:t>-engineering/under-the-hood-scheduling-mapreduce-jobs-more-efficiently-with-corona/</a:t>
             </a:r>
             <a:endParaRPr lang="en-US" sz="1900" dirty="0"/>
           </a:p>
           <a:p>
-            <a:endParaRPr lang="en-US" dirty="0" smtClean="0"/>
+            <a:endParaRPr lang="en-US" dirty="0"/>
           </a:p>
           <a:p>
             <a:endParaRPr lang="en-US" dirty="0"/>
@@ -8192,7 +8125,7 @@
           <a:lstStyle/>
           <a:p>
             <a:r>
-              <a:rPr lang="en-US" dirty="0" err="1" smtClean="0"/>
+              <a:rPr lang="en-US" dirty="0" err="1"/>
               <a:t>HopFS</a:t>
             </a:r>
             <a:endParaRPr lang="en-US" dirty="0"/>
@@ -8326,21 +8259,16 @@
           <a:lstStyle/>
           <a:p>
             <a:r>
-              <a:rPr lang="en-US" dirty="0" err="1" smtClean="0"/>
+              <a:rPr lang="en-US" dirty="0" err="1"/>
               <a:t>CassandraFS</a:t>
             </a:r>
-            <a:r>
-              <a:rPr lang="en-US" dirty="0" smtClean="0"/>
-              <a:t/>
-            </a:r>
             <a:br>
-              <a:rPr lang="en-US" dirty="0" smtClean="0"/>
+              <a:rPr lang="en-US" dirty="0"/>
             </a:br>
             <a:r>
-              <a:rPr lang="en-US" dirty="0" smtClean="0"/>
+              <a:rPr lang="en-US" dirty="0"/>
               <a:t>(not open source)</a:t>
             </a:r>
-            <a:endParaRPr lang="en-US" dirty="0"/>
           </a:p>
         </p:txBody>
       </p:sp>
@@ -8380,13 +8308,6 @@
   <p:clrMapOvr>
     <a:masterClrMapping/>
   </p:clrMapOvr>
-  <p:timing>
-    <p:tnLst>
-      <p:par>
-        <p:cTn xmlns:p14="http://schemas.microsoft.com/office/powerpoint/2010/main" id="1" dur="indefinite" restart="never" nodeType="tmRoot"/>
-      </p:par>
-    </p:tnLst>
-  </p:timing>
 </p:sld>
 </file>
 
@@ -8423,10 +8344,9 @@
           <a:lstStyle/>
           <a:p>
             <a:r>
-              <a:rPr lang="en-US" dirty="0" smtClean="0"/>
+              <a:rPr lang="en-US" dirty="0"/>
               <a:t>Amazon S3</a:t>
             </a:r>
-            <a:endParaRPr lang="en-US" dirty="0"/>
           </a:p>
         </p:txBody>
       </p:sp>
@@ -8446,41 +8366,41 @@
           <a:lstStyle/>
           <a:p>
             <a:r>
-              <a:rPr lang="en-US" dirty="0" smtClean="0"/>
+              <a:rPr lang="en-US" dirty="0"/>
               <a:t>Simple Storage Service</a:t>
             </a:r>
           </a:p>
           <a:p>
             <a:r>
-              <a:rPr lang="en-US" dirty="0" smtClean="0"/>
+              <a:rPr lang="en-US" dirty="0"/>
               <a:t>Unlimited storage of files </a:t>
             </a:r>
           </a:p>
           <a:p>
             <a:pPr lvl="1"/>
             <a:r>
-              <a:rPr lang="en-US" dirty="0" smtClean="0"/>
+              <a:rPr lang="en-US" dirty="0"/>
               <a:t>Up to 5 terabytes each</a:t>
             </a:r>
           </a:p>
           <a:p>
             <a:pPr lvl="1"/>
             <a:r>
-              <a:rPr lang="en-US" dirty="0" smtClean="0"/>
+              <a:rPr lang="en-US" dirty="0"/>
               <a:t>Stored in named “buckets”</a:t>
             </a:r>
           </a:p>
           <a:p>
             <a:pPr lvl="1"/>
             <a:r>
-              <a:rPr lang="en-US" dirty="0" smtClean="0"/>
+              <a:rPr lang="en-US" dirty="0"/>
               <a:t>Accessible via AWS APIs or HTTP</a:t>
             </a:r>
           </a:p>
           <a:p>
             <a:pPr lvl="1"/>
             <a:r>
-              <a:rPr lang="en-US" dirty="0" smtClean="0"/>
+              <a:rPr lang="en-US" dirty="0"/>
               <a:t>Authenticated or Public</a:t>
             </a:r>
           </a:p>
@@ -8534,81 +8454,80 @@
           <a:lstStyle/>
           <a:p>
             <a:r>
-              <a:rPr lang="en-US" dirty="0" smtClean="0"/>
+              <a:rPr lang="en-US" dirty="0"/>
               <a:t>Spark packages</a:t>
             </a:r>
+          </a:p>
+        </p:txBody>
+      </p:sp>
+      <p:sp>
+        <p:nvSpPr>
+          <p:cNvPr id="3" name="Content Placeholder 2"/>
+          <p:cNvSpPr>
+            <a:spLocks noGrp="1"/>
+          </p:cNvSpPr>
+          <p:nvPr>
+            <p:ph idx="1"/>
+          </p:nvPr>
+        </p:nvSpPr>
+        <p:spPr/>
+        <p:txBody>
+          <a:bodyPr/>
+          <a:lstStyle/>
+          <a:p>
+            <a:r>
+              <a:rPr lang="en-US" dirty="0"/>
+              <a:t>A wide set of plugins</a:t>
+            </a:r>
+          </a:p>
+          <a:p>
+            <a:pPr lvl="1"/>
+            <a:r>
+              <a:rPr lang="en-US" dirty="0"/>
+              <a:t>Currently 148 community donated plugins</a:t>
+            </a:r>
+          </a:p>
+          <a:p>
+            <a:r>
+              <a:rPr lang="en-US" dirty="0"/>
+              <a:t> Data connectors	</a:t>
+            </a:r>
+          </a:p>
+          <a:p>
+            <a:pPr lvl="1"/>
+            <a:r>
+              <a:rPr lang="en-US" dirty="0"/>
+              <a:t>Cassandra, </a:t>
+            </a:r>
+            <a:r>
+              <a:rPr lang="en-US" dirty="0" err="1"/>
+              <a:t>Couchbase</a:t>
+            </a:r>
+            <a:r>
+              <a:rPr lang="en-US" dirty="0"/>
+              <a:t>, Mongo, CSV, </a:t>
+            </a:r>
+            <a:r>
+              <a:rPr lang="en-US" dirty="0" err="1"/>
+              <a:t>etc</a:t>
+            </a:r>
             <a:endParaRPr lang="en-US" dirty="0"/>
           </a:p>
-        </p:txBody>
-      </p:sp>
-      <p:sp>
-        <p:nvSpPr>
-          <p:cNvPr id="3" name="Content Placeholder 2"/>
-          <p:cNvSpPr>
-            <a:spLocks noGrp="1"/>
-          </p:cNvSpPr>
-          <p:nvPr>
-            <p:ph idx="1"/>
-          </p:nvPr>
-        </p:nvSpPr>
-        <p:spPr/>
-        <p:txBody>
-          <a:bodyPr/>
-          <a:lstStyle/>
-          <a:p>
-            <a:r>
-              <a:rPr lang="en-US" dirty="0" smtClean="0"/>
-              <a:t>A wide set of plugins</a:t>
-            </a:r>
-          </a:p>
-          <a:p>
-            <a:pPr lvl="1"/>
-            <a:r>
-              <a:rPr lang="en-US" dirty="0" smtClean="0"/>
-              <a:t>Currently 148 community donated plugins</a:t>
-            </a:r>
-          </a:p>
-          <a:p>
-            <a:r>
-              <a:rPr lang="en-US" dirty="0" smtClean="0"/>
-              <a:t> Data connectors	</a:t>
-            </a:r>
-          </a:p>
-          <a:p>
-            <a:pPr lvl="1"/>
-            <a:r>
-              <a:rPr lang="en-US" dirty="0" smtClean="0"/>
-              <a:t>Cassandra, </a:t>
-            </a:r>
-            <a:r>
-              <a:rPr lang="en-US" dirty="0" err="1" smtClean="0"/>
-              <a:t>Couchbase</a:t>
-            </a:r>
-            <a:r>
-              <a:rPr lang="en-US" dirty="0" smtClean="0"/>
-              <a:t>, Mongo, CSV, </a:t>
-            </a:r>
-            <a:r>
-              <a:rPr lang="en-US" dirty="0" err="1" smtClean="0"/>
-              <a:t>etc</a:t>
-            </a:r>
-            <a:endParaRPr lang="en-US" dirty="0" smtClean="0"/>
-          </a:p>
-          <a:p>
-            <a:r>
-              <a:rPr lang="en-US" dirty="0" smtClean="0"/>
+          <a:p>
+            <a:r>
+              <a:rPr lang="en-US" dirty="0"/>
               <a:t>Machine Learning, Neural networks</a:t>
             </a:r>
           </a:p>
           <a:p>
             <a:r>
-              <a:rPr lang="en-US" dirty="0" smtClean="0"/>
+              <a:rPr lang="en-US" dirty="0"/>
               <a:t>Streaming</a:t>
             </a:r>
           </a:p>
           <a:p>
             <a:r>
-              <a:rPr lang="en-US" dirty="0" err="1" smtClean="0"/>
+              <a:rPr lang="en-US" dirty="0" err="1"/>
               <a:t>etc</a:t>
             </a:r>
             <a:endParaRPr lang="en-US" dirty="0"/>
@@ -8625,13 +8544,6 @@
   <p:clrMapOvr>
     <a:masterClrMapping/>
   </p:clrMapOvr>
-  <p:timing>
-    <p:tnLst>
-      <p:par>
-        <p:cTn xmlns:p14="http://schemas.microsoft.com/office/powerpoint/2010/main" id="1" dur="indefinite" restart="never" nodeType="tmRoot"/>
-      </p:par>
-    </p:tnLst>
-  </p:timing>
 </p:sld>
 </file>
 

</xml_diff>